<commit_message>
feat: ptt version 4
</commit_message>
<xml_diff>
--- a/ppt/MH_Laura_Javier T2.pptx
+++ b/ppt/MH_Laura_Javier T2.pptx
@@ -9,8 +9,8 @@
   </p:notesMasterIdLst>
   <p:sldIdLst>
     <p:sldId id="256" r:id="rId2"/>
-    <p:sldId id="270" r:id="rId3"/>
-    <p:sldId id="257" r:id="rId4"/>
+    <p:sldId id="257" r:id="rId3"/>
+    <p:sldId id="270" r:id="rId4"/>
     <p:sldId id="258" r:id="rId5"/>
     <p:sldId id="259" r:id="rId6"/>
     <p:sldId id="262" r:id="rId7"/>
@@ -142,9 +142,9 @@
 </file>
 
 <file path=ppt/charts/chart1.xml><?xml version="1.0" encoding="utf-8"?>
-<c:chartSpace xmlns:c="http://schemas.openxmlformats.org/drawingml/2006/chart" xmlns:a="http://schemas.openxmlformats.org/drawingml/2006/main" xmlns:r="http://schemas.openxmlformats.org/officeDocument/2006/relationships">
+<c:chartSpace xmlns:c="http://schemas.openxmlformats.org/drawingml/2006/chart" xmlns:a="http://schemas.openxmlformats.org/drawingml/2006/main" xmlns:r="http://schemas.openxmlformats.org/officeDocument/2006/relationships" xmlns:c16r2="http://schemas.microsoft.com/office/drawing/2015/06/chart">
   <c:date1904 val="0"/>
-  <c:lang val="es-ES"/>
+  <c:lang val="en-US"/>
   <c:roundedCorners val="0"/>
   <mc:AlternateContent xmlns:mc="http://schemas.openxmlformats.org/markup-compatibility/2006">
     <mc:Choice xmlns:c14="http://schemas.microsoft.com/office/drawing/2007/8/2/chart" Requires="c14">
@@ -244,6 +244,11 @@
               </c:numCache>
             </c:numRef>
           </c:val>
+          <c:extLst>
+            <c:ext xmlns:c16="http://schemas.microsoft.com/office/drawing/2014/chart" uri="{C3380CC4-5D6E-409C-BE32-E72D297353CC}">
+              <c16:uniqueId val="{00000000-D186-4498-9989-EA998F9CE702}"/>
+            </c:ext>
+          </c:extLst>
         </c:ser>
         <c:ser>
           <c:idx val="1"/>
@@ -316,6 +321,11 @@
               </c:numCache>
             </c:numRef>
           </c:val>
+          <c:extLst>
+            <c:ext xmlns:c16="http://schemas.microsoft.com/office/drawing/2014/chart" uri="{C3380CC4-5D6E-409C-BE32-E72D297353CC}">
+              <c16:uniqueId val="{00000001-D186-4498-9989-EA998F9CE702}"/>
+            </c:ext>
+          </c:extLst>
         </c:ser>
         <c:ser>
           <c:idx val="2"/>
@@ -388,6 +398,11 @@
               </c:numCache>
             </c:numRef>
           </c:val>
+          <c:extLst>
+            <c:ext xmlns:c16="http://schemas.microsoft.com/office/drawing/2014/chart" uri="{C3380CC4-5D6E-409C-BE32-E72D297353CC}">
+              <c16:uniqueId val="{00000002-D186-4498-9989-EA998F9CE702}"/>
+            </c:ext>
+          </c:extLst>
         </c:ser>
         <c:dLbls>
           <c:showLegendKey val="0"/>
@@ -431,7 +446,7 @@
           <a:lstStyle/>
           <a:p>
             <a:pPr>
-              <a:defRPr sz="900" b="0" i="0" u="none" strike="noStrike" kern="1200" baseline="0">
+              <a:defRPr sz="1200" b="0" i="0" u="none" strike="noStrike" kern="1200" baseline="0">
                 <a:solidFill>
                   <a:schemeClr val="tx1">
                     <a:lumMod val="65000"/>
@@ -519,7 +534,6 @@
     </c:plotArea>
     <c:legend>
       <c:legendPos val="b"/>
-      <c:layout/>
       <c:overlay val="0"/>
       <c:spPr>
         <a:noFill/>
@@ -533,7 +547,7 @@
         <a:lstStyle/>
         <a:p>
           <a:pPr>
-            <a:defRPr sz="900" b="0" i="0" u="none" strike="noStrike" kern="1200" baseline="0">
+            <a:defRPr sz="1200" b="0" i="0" u="none" strike="noStrike" kern="1200" baseline="0">
               <a:solidFill>
                 <a:schemeClr val="tx1">
                   <a:lumMod val="65000"/>
@@ -1360,7 +1374,7 @@
           <a:p>
             <a:fld id="{65154C0B-E2C7-4D9E-827C-72C00C2A711B}" type="slidenum">
               <a:rPr lang="es-ES" smtClean="0"/>
-              <a:t>‹Nº›</a:t>
+              <a:t>‹#›</a:t>
             </a:fld>
             <a:endParaRPr lang="es-ES"/>
           </a:p>
@@ -1987,7 +2001,7 @@
           <a:p>
             <a:fld id="{D0D03522-ACFB-465D-BFFC-5FB31DCDE28F}" type="slidenum">
               <a:rPr lang="es-ES" smtClean="0"/>
-              <a:t>‹Nº›</a:t>
+              <a:t>‹#›</a:t>
             </a:fld>
             <a:endParaRPr lang="es-ES"/>
           </a:p>
@@ -2195,7 +2209,7 @@
           <a:p>
             <a:fld id="{D0D03522-ACFB-465D-BFFC-5FB31DCDE28F}" type="slidenum">
               <a:rPr lang="es-ES" smtClean="0"/>
-              <a:t>‹Nº›</a:t>
+              <a:t>‹#›</a:t>
             </a:fld>
             <a:endParaRPr lang="es-ES"/>
           </a:p>
@@ -2375,7 +2389,7 @@
           <a:p>
             <a:fld id="{D0D03522-ACFB-465D-BFFC-5FB31DCDE28F}" type="slidenum">
               <a:rPr lang="es-ES" smtClean="0"/>
-              <a:t>‹Nº›</a:t>
+              <a:t>‹#›</a:t>
             </a:fld>
             <a:endParaRPr lang="es-ES"/>
           </a:p>
@@ -2545,7 +2559,7 @@
           <a:p>
             <a:fld id="{D0D03522-ACFB-465D-BFFC-5FB31DCDE28F}" type="slidenum">
               <a:rPr lang="es-ES" smtClean="0"/>
-              <a:t>‹Nº›</a:t>
+              <a:t>‹#›</a:t>
             </a:fld>
             <a:endParaRPr lang="es-ES"/>
           </a:p>
@@ -2799,7 +2813,7 @@
           <a:p>
             <a:fld id="{D0D03522-ACFB-465D-BFFC-5FB31DCDE28F}" type="slidenum">
               <a:rPr lang="es-ES" smtClean="0"/>
-              <a:t>‹Nº›</a:t>
+              <a:t>‹#›</a:t>
             </a:fld>
             <a:endParaRPr lang="es-ES"/>
           </a:p>
@@ -3125,7 +3139,7 @@
           <a:p>
             <a:fld id="{D0D03522-ACFB-465D-BFFC-5FB31DCDE28F}" type="slidenum">
               <a:rPr lang="es-ES" smtClean="0"/>
-              <a:t>‹Nº›</a:t>
+              <a:t>‹#›</a:t>
             </a:fld>
             <a:endParaRPr lang="es-ES"/>
           </a:p>
@@ -3576,7 +3590,7 @@
           <a:p>
             <a:fld id="{D0D03522-ACFB-465D-BFFC-5FB31DCDE28F}" type="slidenum">
               <a:rPr lang="es-ES" smtClean="0"/>
-              <a:t>‹Nº›</a:t>
+              <a:t>‹#›</a:t>
             </a:fld>
             <a:endParaRPr lang="es-ES"/>
           </a:p>
@@ -3694,7 +3708,7 @@
           <a:p>
             <a:fld id="{D0D03522-ACFB-465D-BFFC-5FB31DCDE28F}" type="slidenum">
               <a:rPr lang="es-ES" smtClean="0"/>
-              <a:t>‹Nº›</a:t>
+              <a:t>‹#›</a:t>
             </a:fld>
             <a:endParaRPr lang="es-ES"/>
           </a:p>
@@ -3789,7 +3803,7 @@
           <a:p>
             <a:fld id="{D0D03522-ACFB-465D-BFFC-5FB31DCDE28F}" type="slidenum">
               <a:rPr lang="es-ES" smtClean="0"/>
-              <a:t>‹Nº›</a:t>
+              <a:t>‹#›</a:t>
             </a:fld>
             <a:endParaRPr lang="es-ES"/>
           </a:p>
@@ -4076,7 +4090,7 @@
           <a:p>
             <a:fld id="{D0D03522-ACFB-465D-BFFC-5FB31DCDE28F}" type="slidenum">
               <a:rPr lang="es-ES" smtClean="0"/>
-              <a:t>‹Nº›</a:t>
+              <a:t>‹#›</a:t>
             </a:fld>
             <a:endParaRPr lang="es-ES"/>
           </a:p>
@@ -4398,7 +4412,7 @@
           <a:p>
             <a:fld id="{D0D03522-ACFB-465D-BFFC-5FB31DCDE28F}" type="slidenum">
               <a:rPr lang="es-ES" smtClean="0"/>
-              <a:t>‹Nº›</a:t>
+              <a:t>‹#›</a:t>
             </a:fld>
             <a:endParaRPr lang="es-ES"/>
           </a:p>
@@ -4692,7 +4706,7 @@
           <a:p>
             <a:fld id="{D0D03522-ACFB-465D-BFFC-5FB31DCDE28F}" type="slidenum">
               <a:rPr lang="es-ES" smtClean="0"/>
-              <a:t>‹Nº›</a:t>
+              <a:t>‹#›</a:t>
             </a:fld>
             <a:endParaRPr lang="es-ES"/>
           </a:p>
@@ -7120,7 +7134,7 @@
           <p:nvPr>
             <p:extLst>
               <p:ext uri="{D42A27DB-BD31-4B8C-83A1-F6EECF244321}">
-                <p14:modId xmlns:p14="http://schemas.microsoft.com/office/powerpoint/2010/main" val="352751526"/>
+                <p14:modId xmlns:p14="http://schemas.microsoft.com/office/powerpoint/2010/main" val="3825528206"/>
               </p:ext>
             </p:extLst>
           </p:nvPr>
@@ -7220,6 +7234,11 @@
           <a:bodyPr/>
           <a:lstStyle/>
           <a:p>
+            <a:pPr algn="just">
+              <a:lnSpc>
+                <a:spcPct val="150000"/>
+              </a:lnSpc>
+            </a:pPr>
             <a:r>
               <a:rPr lang="es-ES" dirty="0" smtClean="0"/>
               <a:t>Para las P-</a:t>
@@ -7242,6 +7261,11 @@
             </a:r>
           </a:p>
           <a:p>
+            <a:pPr algn="just">
+              <a:lnSpc>
+                <a:spcPct val="150000"/>
+              </a:lnSpc>
+            </a:pPr>
             <a:r>
               <a:rPr lang="es-ES" dirty="0" smtClean="0"/>
               <a:t> Para las S-</a:t>
@@ -7252,7 +7276,66 @@
             </a:r>
             <a:r>
               <a:rPr lang="es-ES" dirty="0" smtClean="0"/>
-              <a:t> en todas las instancias el Camino Aleatorio dio mejor resultado que el Escalador de Colinas, lo que significa que se está estancando en mínimos	 locales.</a:t>
+              <a:t> en todas las instancias el Camino Aleatorio dio mejor resultado que el Escalador de Colinas, lo que significa que </a:t>
+            </a:r>
+            <a:r>
+              <a:rPr lang="es-ES" smtClean="0"/>
+              <a:t>esta última </a:t>
+            </a:r>
+            <a:r>
+              <a:rPr lang="es-ES" dirty="0" err="1" smtClean="0"/>
+              <a:t>metaheurística</a:t>
+            </a:r>
+            <a:r>
+              <a:rPr lang="es-ES" dirty="0" smtClean="0"/>
+              <a:t> se está estancando en mínimos locales.</a:t>
+            </a:r>
+          </a:p>
+          <a:p>
+            <a:pPr algn="just">
+              <a:lnSpc>
+                <a:spcPct val="150000"/>
+              </a:lnSpc>
+            </a:pPr>
+            <a:r>
+              <a:rPr lang="es-ES" dirty="0" smtClean="0"/>
+              <a:t>A medida que disminuye el paso disminuye la media de los errores generados por los diferentes algoritmos </a:t>
+            </a:r>
+            <a:r>
+              <a:rPr lang="es-ES" dirty="0" err="1" smtClean="0"/>
+              <a:t>metaheurísticos</a:t>
+            </a:r>
+            <a:r>
+              <a:rPr lang="es-ES" dirty="0" smtClean="0"/>
+              <a:t>. </a:t>
+            </a:r>
+            <a:endParaRPr lang="es-ES" dirty="0"/>
+          </a:p>
+          <a:p>
+            <a:pPr algn="just">
+              <a:lnSpc>
+                <a:spcPct val="150000"/>
+              </a:lnSpc>
+            </a:pPr>
+            <a:r>
+              <a:rPr lang="es-ES" dirty="0" smtClean="0"/>
+              <a:t>La mejor solución encontrada </a:t>
+            </a:r>
+            <a:r>
+              <a:rPr lang="es-ES" dirty="0"/>
+              <a:t>fue [0.0, 0.6, 0.6, 0.3, -0.6</a:t>
+            </a:r>
+            <a:r>
+              <a:rPr lang="es-ES" dirty="0" smtClean="0"/>
+              <a:t>] con evaluación de 0.19, realizada con paso 0.3 y como </a:t>
+            </a:r>
+            <a:r>
+              <a:rPr lang="es-ES" dirty="0" err="1" smtClean="0"/>
+              <a:t>metaheuristica</a:t>
+            </a:r>
+            <a:r>
+              <a:rPr lang="es-ES" dirty="0" smtClean="0"/>
+              <a:t> Camino Aleatorio.</a:t>
             </a:r>
             <a:endParaRPr lang="es-ES" dirty="0"/>
           </a:p>
@@ -7381,6 +7464,146 @@
 </file>
 
 <file path=ppt/slides/slide2.xml><?xml version="1.0" encoding="utf-8"?>
+<p:sld xmlns:a="http://schemas.openxmlformats.org/drawingml/2006/main" xmlns:r="http://schemas.openxmlformats.org/officeDocument/2006/relationships" xmlns:p="http://schemas.openxmlformats.org/presentationml/2006/main">
+  <p:cSld>
+    <p:spTree>
+      <p:nvGrpSpPr>
+        <p:cNvPr id="1" name=""/>
+        <p:cNvGrpSpPr/>
+        <p:nvPr/>
+      </p:nvGrpSpPr>
+      <p:grpSpPr>
+        <a:xfrm>
+          <a:off x="0" y="0"/>
+          <a:ext cx="0" cy="0"/>
+          <a:chOff x="0" y="0"/>
+          <a:chExt cx="0" cy="0"/>
+        </a:xfrm>
+      </p:grpSpPr>
+      <p:sp>
+        <p:nvSpPr>
+          <p:cNvPr id="2" name="Title 1"/>
+          <p:cNvSpPr>
+            <a:spLocks noGrp="1"/>
+          </p:cNvSpPr>
+          <p:nvPr>
+            <p:ph type="title"/>
+          </p:nvPr>
+        </p:nvSpPr>
+        <p:spPr>
+          <a:xfrm>
+            <a:off x="1261872" y="365760"/>
+            <a:ext cx="9692640" cy="721360"/>
+          </a:xfrm>
+        </p:spPr>
+        <p:txBody>
+          <a:bodyPr/>
+          <a:lstStyle/>
+          <a:p>
+            <a:r>
+              <a:rPr lang="es-ES" dirty="0" smtClean="0"/>
+              <a:t>Descripción general</a:t>
+            </a:r>
+            <a:endParaRPr lang="es-ES" dirty="0"/>
+          </a:p>
+        </p:txBody>
+      </p:sp>
+      <p:sp>
+        <p:nvSpPr>
+          <p:cNvPr id="3" name="Content Placeholder 2"/>
+          <p:cNvSpPr>
+            <a:spLocks noGrp="1"/>
+          </p:cNvSpPr>
+          <p:nvPr>
+            <p:ph idx="1"/>
+          </p:nvPr>
+        </p:nvSpPr>
+        <p:spPr>
+          <a:xfrm>
+            <a:off x="1261872" y="1239520"/>
+            <a:ext cx="8595360" cy="4348479"/>
+          </a:xfrm>
+        </p:spPr>
+        <p:txBody>
+          <a:bodyPr>
+            <a:normAutofit/>
+          </a:bodyPr>
+          <a:lstStyle/>
+          <a:p>
+            <a:pPr marL="0" indent="0" algn="just">
+              <a:buNone/>
+            </a:pPr>
+            <a:r>
+              <a:rPr lang="es-ES" dirty="0"/>
+              <a:t>Se tienen datos de la lluvia en varios días, así como de la cantidad de lluvia que cayó en los 5 días previos. Un investigador considera que la lluvia depende linealmente de la lluvia en los días previos de la forma: L = K1*L1 + K2*L2 + K3*L3 + K4*L4 + K5*L5, donde L es la lluvia en un día dado, mientras que Li indica la cantidad de lluvia en el día i. El investigador quiere ajustar el modelo para lo cual debe conseguir encontrar los valores K1, K2, K3, K4 y K5 que minimicen el error entre lo que indica el modelo y los valores reales guardados.</a:t>
+            </a:r>
+          </a:p>
+          <a:p>
+            <a:pPr>
+              <a:lnSpc>
+                <a:spcPct val="150000"/>
+              </a:lnSpc>
+            </a:pPr>
+            <a:r>
+              <a:rPr lang="en-US" dirty="0"/>
+              <a:t>Variables: </a:t>
+            </a:r>
+            <a:r>
+              <a:rPr lang="es-ES" dirty="0"/>
+              <a:t>K1, K2, K3, K4 y K5</a:t>
+            </a:r>
+            <a:endParaRPr lang="en-US" dirty="0"/>
+          </a:p>
+          <a:p>
+            <a:pPr>
+              <a:lnSpc>
+                <a:spcPct val="150000"/>
+              </a:lnSpc>
+            </a:pPr>
+            <a:r>
+              <a:rPr lang="es-ES" dirty="0"/>
+              <a:t>Restricciones: -</a:t>
+            </a:r>
+          </a:p>
+          <a:p>
+            <a:pPr>
+              <a:lnSpc>
+                <a:spcPct val="150000"/>
+              </a:lnSpc>
+            </a:pPr>
+            <a:r>
+              <a:rPr lang="es-ES" dirty="0"/>
+              <a:t>Objetivo: </a:t>
+            </a:r>
+            <a:r>
+              <a:rPr lang="es-ES" dirty="0" smtClean="0"/>
+              <a:t>Minimización</a:t>
+            </a:r>
+            <a:endParaRPr lang="es-ES" dirty="0"/>
+          </a:p>
+        </p:txBody>
+      </p:sp>
+    </p:spTree>
+    <p:extLst>
+      <p:ext uri="{BB962C8B-B14F-4D97-AF65-F5344CB8AC3E}">
+        <p14:creationId xmlns:p14="http://schemas.microsoft.com/office/powerpoint/2010/main" val="761782049"/>
+      </p:ext>
+    </p:extLst>
+  </p:cSld>
+  <p:clrMapOvr>
+    <a:masterClrMapping/>
+  </p:clrMapOvr>
+  <p:timing>
+    <p:tnLst>
+      <p:par>
+        <p:cTn id="1" dur="indefinite" restart="never" nodeType="tmRoot"/>
+      </p:par>
+    </p:tnLst>
+  </p:timing>
+</p:sld>
+</file>
+
+<file path=ppt/slides/slide3.xml><?xml version="1.0" encoding="utf-8"?>
 <p:sld xmlns:a="http://schemas.openxmlformats.org/drawingml/2006/main" xmlns:r="http://schemas.openxmlformats.org/officeDocument/2006/relationships" xmlns:p="http://schemas.openxmlformats.org/presentationml/2006/main">
   <p:cSld>
     <p:spTree>
@@ -8233,146 +8456,6 @@
 </p:sld>
 </file>
 
-<file path=ppt/slides/slide3.xml><?xml version="1.0" encoding="utf-8"?>
-<p:sld xmlns:a="http://schemas.openxmlformats.org/drawingml/2006/main" xmlns:r="http://schemas.openxmlformats.org/officeDocument/2006/relationships" xmlns:p="http://schemas.openxmlformats.org/presentationml/2006/main">
-  <p:cSld>
-    <p:spTree>
-      <p:nvGrpSpPr>
-        <p:cNvPr id="1" name=""/>
-        <p:cNvGrpSpPr/>
-        <p:nvPr/>
-      </p:nvGrpSpPr>
-      <p:grpSpPr>
-        <a:xfrm>
-          <a:off x="0" y="0"/>
-          <a:ext cx="0" cy="0"/>
-          <a:chOff x="0" y="0"/>
-          <a:chExt cx="0" cy="0"/>
-        </a:xfrm>
-      </p:grpSpPr>
-      <p:sp>
-        <p:nvSpPr>
-          <p:cNvPr id="2" name="Title 1"/>
-          <p:cNvSpPr>
-            <a:spLocks noGrp="1"/>
-          </p:cNvSpPr>
-          <p:nvPr>
-            <p:ph type="title"/>
-          </p:nvPr>
-        </p:nvSpPr>
-        <p:spPr>
-          <a:xfrm>
-            <a:off x="1261872" y="365760"/>
-            <a:ext cx="9692640" cy="721360"/>
-          </a:xfrm>
-        </p:spPr>
-        <p:txBody>
-          <a:bodyPr/>
-          <a:lstStyle/>
-          <a:p>
-            <a:r>
-              <a:rPr lang="es-ES" dirty="0" smtClean="0"/>
-              <a:t>Descripción general</a:t>
-            </a:r>
-            <a:endParaRPr lang="es-ES" dirty="0"/>
-          </a:p>
-        </p:txBody>
-      </p:sp>
-      <p:sp>
-        <p:nvSpPr>
-          <p:cNvPr id="3" name="Content Placeholder 2"/>
-          <p:cNvSpPr>
-            <a:spLocks noGrp="1"/>
-          </p:cNvSpPr>
-          <p:nvPr>
-            <p:ph idx="1"/>
-          </p:nvPr>
-        </p:nvSpPr>
-        <p:spPr>
-          <a:xfrm>
-            <a:off x="1261872" y="1239520"/>
-            <a:ext cx="8595360" cy="4348479"/>
-          </a:xfrm>
-        </p:spPr>
-        <p:txBody>
-          <a:bodyPr>
-            <a:normAutofit/>
-          </a:bodyPr>
-          <a:lstStyle/>
-          <a:p>
-            <a:pPr marL="0" indent="0" algn="just">
-              <a:buNone/>
-            </a:pPr>
-            <a:r>
-              <a:rPr lang="es-ES" dirty="0"/>
-              <a:t>Se tienen datos de la lluvia en varios días, así como de la cantidad de lluvia que cayó en los 5 días previos. Un investigador considera que la lluvia depende linealmente de la lluvia en los días previos de la forma: L = K1*L1 + K2*L2 + K3*L3 + K4*L4 + K5*L5, donde L es la lluvia en un día dado, mientras que Li indica la cantidad de lluvia en el día i. El investigador quiere ajustar el modelo para lo cual debe conseguir encontrar los valores K1, K2, K3, K4 y K5 que minimicen el error entre lo que indica el modelo y los valores reales guardados.</a:t>
-            </a:r>
-          </a:p>
-          <a:p>
-            <a:pPr>
-              <a:lnSpc>
-                <a:spcPct val="150000"/>
-              </a:lnSpc>
-            </a:pPr>
-            <a:r>
-              <a:rPr lang="en-US" dirty="0"/>
-              <a:t>Variables: </a:t>
-            </a:r>
-            <a:r>
-              <a:rPr lang="es-ES" dirty="0"/>
-              <a:t>K1, K2, K3, K4 y K5</a:t>
-            </a:r>
-            <a:endParaRPr lang="en-US" dirty="0"/>
-          </a:p>
-          <a:p>
-            <a:pPr>
-              <a:lnSpc>
-                <a:spcPct val="150000"/>
-              </a:lnSpc>
-            </a:pPr>
-            <a:r>
-              <a:rPr lang="es-ES" dirty="0"/>
-              <a:t>Restricciones: -</a:t>
-            </a:r>
-          </a:p>
-          <a:p>
-            <a:pPr>
-              <a:lnSpc>
-                <a:spcPct val="150000"/>
-              </a:lnSpc>
-            </a:pPr>
-            <a:r>
-              <a:rPr lang="es-ES" dirty="0"/>
-              <a:t>Objetivo: </a:t>
-            </a:r>
-            <a:r>
-              <a:rPr lang="es-ES" dirty="0" smtClean="0"/>
-              <a:t>Minimización</a:t>
-            </a:r>
-            <a:endParaRPr lang="es-ES" dirty="0"/>
-          </a:p>
-        </p:txBody>
-      </p:sp>
-    </p:spTree>
-    <p:extLst>
-      <p:ext uri="{BB962C8B-B14F-4D97-AF65-F5344CB8AC3E}">
-        <p14:creationId xmlns:p14="http://schemas.microsoft.com/office/powerpoint/2010/main" val="761782049"/>
-      </p:ext>
-    </p:extLst>
-  </p:cSld>
-  <p:clrMapOvr>
-    <a:masterClrMapping/>
-  </p:clrMapOvr>
-  <p:timing>
-    <p:tnLst>
-      <p:par>
-        <p:cTn id="1" dur="indefinite" restart="never" nodeType="tmRoot"/>
-      </p:par>
-    </p:tnLst>
-  </p:timing>
-</p:sld>
-</file>
-
 <file path=ppt/slides/slide4.xml><?xml version="1.0" encoding="utf-8"?>
 <p:sld xmlns:a="http://schemas.openxmlformats.org/drawingml/2006/main" xmlns:r="http://schemas.openxmlformats.org/officeDocument/2006/relationships" xmlns:p="http://schemas.openxmlformats.org/presentationml/2006/main">
   <p:cSld>
@@ -8457,7 +8540,7 @@
           <p:nvPr>
             <p:extLst>
               <p:ext uri="{D42A27DB-BD31-4B8C-83A1-F6EECF244321}">
-                <p14:modId xmlns:p14="http://schemas.microsoft.com/office/powerpoint/2010/main" val="2003286149"/>
+                <p14:modId xmlns:p14="http://schemas.microsoft.com/office/powerpoint/2010/main" val="3024838081"/>
               </p:ext>
             </p:extLst>
           </p:nvPr>
@@ -8476,21 +8559,21 @@
                 <a:gridCol w="406400">
                   <a:extLst>
                     <a:ext uri="{9D8B030D-6E8A-4147-A177-3AD203B41FA5}">
-                      <a16:colId xmlns:a16="http://schemas.microsoft.com/office/drawing/2014/main" xmlns="" val="1801000517"/>
+                      <a16:colId xmlns:a16="http://schemas.microsoft.com/office/drawing/2014/main" val="1801000517"/>
                     </a:ext>
                   </a:extLst>
                 </a:gridCol>
                 <a:gridCol w="375920">
                   <a:extLst>
                     <a:ext uri="{9D8B030D-6E8A-4147-A177-3AD203B41FA5}">
-                      <a16:colId xmlns:a16="http://schemas.microsoft.com/office/drawing/2014/main" xmlns="" val="1657204703"/>
+                      <a16:colId xmlns:a16="http://schemas.microsoft.com/office/drawing/2014/main" val="1657204703"/>
                     </a:ext>
                   </a:extLst>
                 </a:gridCol>
                 <a:gridCol w="7325360">
                   <a:extLst>
                     <a:ext uri="{9D8B030D-6E8A-4147-A177-3AD203B41FA5}">
-                      <a16:colId xmlns:a16="http://schemas.microsoft.com/office/drawing/2014/main" xmlns="" val="3305165988"/>
+                      <a16:colId xmlns:a16="http://schemas.microsoft.com/office/drawing/2014/main" val="3305165988"/>
                     </a:ext>
                   </a:extLst>
                 </a:gridCol>
@@ -8519,6 +8602,10 @@
                         <a:rPr lang="es-ES" dirty="0" err="1" smtClean="0"/>
                         <a:t>max</a:t>
                       </a:r>
+                      <a:r>
+                        <a:rPr lang="es-ES" dirty="0" smtClean="0"/>
+                        <a:t> (entero)</a:t>
+                      </a:r>
                       <a:endParaRPr lang="es-ES" dirty="0" smtClean="0"/>
                     </a:p>
                     <a:p>
@@ -8530,6 +8617,10 @@
                         <a:rPr lang="es-ES" dirty="0" err="1" smtClean="0"/>
                         <a:t>intv</a:t>
                       </a:r>
+                      <a:r>
+                        <a:rPr lang="es-ES" dirty="0" smtClean="0"/>
+                        <a:t> (entero)</a:t>
+                      </a:r>
                       <a:endParaRPr lang="es-ES" dirty="0" smtClean="0"/>
                     </a:p>
                     <a:p>
@@ -8539,7 +8630,11 @@
                       </a:r>
                       <a:r>
                         <a:rPr lang="es-ES" dirty="0" err="1" smtClean="0"/>
-                        <a:t>num_vals</a:t>
+                        <a:t>limit</a:t>
+                      </a:r>
+                      <a:r>
+                        <a:rPr lang="es-ES" dirty="0" smtClean="0"/>
+                        <a:t> (entero)</a:t>
                       </a:r>
                       <a:endParaRPr lang="es-ES" dirty="0" smtClean="0"/>
                     </a:p>
@@ -8568,7 +8663,7 @@
                 </a:tc>
                 <a:extLst>
                   <a:ext uri="{0D108BD9-81ED-4DB2-BD59-A6C34878D82A}">
-                    <a16:rowId xmlns:a16="http://schemas.microsoft.com/office/drawing/2014/main" xmlns="" val="1190365663"/>
+                    <a16:rowId xmlns:a16="http://schemas.microsoft.com/office/drawing/2014/main" val="1190365663"/>
                   </a:ext>
                 </a:extLst>
               </a:tr>
@@ -8617,7 +8712,7 @@
                 </a:tc>
                 <a:extLst>
                   <a:ext uri="{0D108BD9-81ED-4DB2-BD59-A6C34878D82A}">
-                    <a16:rowId xmlns:a16="http://schemas.microsoft.com/office/drawing/2014/main" xmlns="" val="1730090890"/>
+                    <a16:rowId xmlns:a16="http://schemas.microsoft.com/office/drawing/2014/main" val="1730090890"/>
                   </a:ext>
                 </a:extLst>
               </a:tr>
@@ -8643,7 +8738,7 @@
                       </a:r>
                       <a:r>
                         <a:rPr lang="es-ES" dirty="0" err="1" smtClean="0"/>
-                        <a:t>num_vals</a:t>
+                        <a:t>limit</a:t>
                       </a:r>
                       <a:r>
                         <a:rPr lang="es-ES" dirty="0" smtClean="0"/>
@@ -8666,7 +8761,7 @@
                 </a:tc>
                 <a:extLst>
                   <a:ext uri="{0D108BD9-81ED-4DB2-BD59-A6C34878D82A}">
-                    <a16:rowId xmlns:a16="http://schemas.microsoft.com/office/drawing/2014/main" xmlns="" val="1626348320"/>
+                    <a16:rowId xmlns:a16="http://schemas.microsoft.com/office/drawing/2014/main" val="1626348320"/>
                   </a:ext>
                 </a:extLst>
               </a:tr>
@@ -8727,7 +8822,7 @@
                 </a:tc>
                 <a:extLst>
                   <a:ext uri="{0D108BD9-81ED-4DB2-BD59-A6C34878D82A}">
-                    <a16:rowId xmlns:a16="http://schemas.microsoft.com/office/drawing/2014/main" xmlns="" val="2554951521"/>
+                    <a16:rowId xmlns:a16="http://schemas.microsoft.com/office/drawing/2014/main" val="2554951521"/>
                   </a:ext>
                 </a:extLst>
               </a:tr>
@@ -8772,7 +8867,7 @@
                 </a:tc>
                 <a:extLst>
                   <a:ext uri="{0D108BD9-81ED-4DB2-BD59-A6C34878D82A}">
-                    <a16:rowId xmlns:a16="http://schemas.microsoft.com/office/drawing/2014/main" xmlns="" val="1427695710"/>
+                    <a16:rowId xmlns:a16="http://schemas.microsoft.com/office/drawing/2014/main" val="1427695710"/>
                   </a:ext>
                 </a:extLst>
               </a:tr>
@@ -8825,7 +8920,7 @@
                 </a:tc>
                 <a:extLst>
                   <a:ext uri="{0D108BD9-81ED-4DB2-BD59-A6C34878D82A}">
-                    <a16:rowId xmlns:a16="http://schemas.microsoft.com/office/drawing/2014/main" xmlns="" val="1009187632"/>
+                    <a16:rowId xmlns:a16="http://schemas.microsoft.com/office/drawing/2014/main" val="1009187632"/>
                   </a:ext>
                 </a:extLst>
               </a:tr>
@@ -8870,7 +8965,7 @@
                 </a:tc>
                 <a:extLst>
                   <a:ext uri="{0D108BD9-81ED-4DB2-BD59-A6C34878D82A}">
-                    <a16:rowId xmlns:a16="http://schemas.microsoft.com/office/drawing/2014/main" xmlns="" val="993100956"/>
+                    <a16:rowId xmlns:a16="http://schemas.microsoft.com/office/drawing/2014/main" val="993100956"/>
                   </a:ext>
                 </a:extLst>
               </a:tr>
@@ -8915,7 +9010,7 @@
                 </a:tc>
                 <a:extLst>
                   <a:ext uri="{0D108BD9-81ED-4DB2-BD59-A6C34878D82A}">
-                    <a16:rowId xmlns:a16="http://schemas.microsoft.com/office/drawing/2014/main" xmlns="" val="3588268998"/>
+                    <a16:rowId xmlns:a16="http://schemas.microsoft.com/office/drawing/2014/main" val="3588268998"/>
                   </a:ext>
                 </a:extLst>
               </a:tr>
@@ -9103,42 +9198,42 @@
                 <a:gridCol w="1354667">
                   <a:extLst>
                     <a:ext uri="{9D8B030D-6E8A-4147-A177-3AD203B41FA5}">
-                      <a16:colId xmlns:a16="http://schemas.microsoft.com/office/drawing/2014/main" xmlns="" val="4031248115"/>
+                      <a16:colId xmlns:a16="http://schemas.microsoft.com/office/drawing/2014/main" val="4031248115"/>
                     </a:ext>
                   </a:extLst>
                 </a:gridCol>
                 <a:gridCol w="1354667">
                   <a:extLst>
                     <a:ext uri="{9D8B030D-6E8A-4147-A177-3AD203B41FA5}">
-                      <a16:colId xmlns:a16="http://schemas.microsoft.com/office/drawing/2014/main" xmlns="" val="220679877"/>
+                      <a16:colId xmlns:a16="http://schemas.microsoft.com/office/drawing/2014/main" val="220679877"/>
                     </a:ext>
                   </a:extLst>
                 </a:gridCol>
                 <a:gridCol w="1354667">
                   <a:extLst>
                     <a:ext uri="{9D8B030D-6E8A-4147-A177-3AD203B41FA5}">
-                      <a16:colId xmlns:a16="http://schemas.microsoft.com/office/drawing/2014/main" xmlns="" val="2773510325"/>
+                      <a16:colId xmlns:a16="http://schemas.microsoft.com/office/drawing/2014/main" val="2773510325"/>
                     </a:ext>
                   </a:extLst>
                 </a:gridCol>
                 <a:gridCol w="1354667">
                   <a:extLst>
                     <a:ext uri="{9D8B030D-6E8A-4147-A177-3AD203B41FA5}">
-                      <a16:colId xmlns:a16="http://schemas.microsoft.com/office/drawing/2014/main" xmlns="" val="269533158"/>
+                      <a16:colId xmlns:a16="http://schemas.microsoft.com/office/drawing/2014/main" val="269533158"/>
                     </a:ext>
                   </a:extLst>
                 </a:gridCol>
                 <a:gridCol w="1354667">
                   <a:extLst>
                     <a:ext uri="{9D8B030D-6E8A-4147-A177-3AD203B41FA5}">
-                      <a16:colId xmlns:a16="http://schemas.microsoft.com/office/drawing/2014/main" xmlns="" val="4000846733"/>
+                      <a16:colId xmlns:a16="http://schemas.microsoft.com/office/drawing/2014/main" val="4000846733"/>
                     </a:ext>
                   </a:extLst>
                 </a:gridCol>
                 <a:gridCol w="1354667">
                   <a:extLst>
                     <a:ext uri="{9D8B030D-6E8A-4147-A177-3AD203B41FA5}">
-                      <a16:colId xmlns:a16="http://schemas.microsoft.com/office/drawing/2014/main" xmlns="" val="465695325"/>
+                      <a16:colId xmlns:a16="http://schemas.microsoft.com/office/drawing/2014/main" val="465695325"/>
                     </a:ext>
                   </a:extLst>
                 </a:gridCol>
@@ -9226,7 +9321,7 @@
                 </a:tc>
                 <a:extLst>
                   <a:ext uri="{0D108BD9-81ED-4DB2-BD59-A6C34878D82A}">
-                    <a16:rowId xmlns:a16="http://schemas.microsoft.com/office/drawing/2014/main" xmlns="" val="1848507414"/>
+                    <a16:rowId xmlns:a16="http://schemas.microsoft.com/office/drawing/2014/main" val="1848507414"/>
                   </a:ext>
                 </a:extLst>
               </a:tr>
@@ -9316,7 +9411,7 @@
                 </a:tc>
                 <a:extLst>
                   <a:ext uri="{0D108BD9-81ED-4DB2-BD59-A6C34878D82A}">
-                    <a16:rowId xmlns:a16="http://schemas.microsoft.com/office/drawing/2014/main" xmlns="" val="3575386969"/>
+                    <a16:rowId xmlns:a16="http://schemas.microsoft.com/office/drawing/2014/main" val="3575386969"/>
                   </a:ext>
                 </a:extLst>
               </a:tr>
@@ -9410,7 +9505,7 @@
                 </a:tc>
                 <a:extLst>
                   <a:ext uri="{0D108BD9-81ED-4DB2-BD59-A6C34878D82A}">
-                    <a16:rowId xmlns:a16="http://schemas.microsoft.com/office/drawing/2014/main" xmlns="" val="4209900852"/>
+                    <a16:rowId xmlns:a16="http://schemas.microsoft.com/office/drawing/2014/main" val="4209900852"/>
                   </a:ext>
                 </a:extLst>
               </a:tr>
@@ -9496,7 +9591,7 @@
                 </a:tc>
                 <a:extLst>
                   <a:ext uri="{0D108BD9-81ED-4DB2-BD59-A6C34878D82A}">
-                    <a16:rowId xmlns:a16="http://schemas.microsoft.com/office/drawing/2014/main" xmlns="" val="2009515904"/>
+                    <a16:rowId xmlns:a16="http://schemas.microsoft.com/office/drawing/2014/main" val="2009515904"/>
                   </a:ext>
                 </a:extLst>
               </a:tr>
@@ -9607,7 +9702,7 @@
                 </a:tc>
                 <a:extLst>
                   <a:ext uri="{0D108BD9-81ED-4DB2-BD59-A6C34878D82A}">
-                    <a16:rowId xmlns:a16="http://schemas.microsoft.com/office/drawing/2014/main" xmlns="" val="3195264674"/>
+                    <a16:rowId xmlns:a16="http://schemas.microsoft.com/office/drawing/2014/main" val="3195264674"/>
                   </a:ext>
                 </a:extLst>
               </a:tr>
@@ -9643,42 +9738,42 @@
                 <a:gridCol w="1354667">
                   <a:extLst>
                     <a:ext uri="{9D8B030D-6E8A-4147-A177-3AD203B41FA5}">
-                      <a16:colId xmlns:a16="http://schemas.microsoft.com/office/drawing/2014/main" xmlns="" val="4031248115"/>
+                      <a16:colId xmlns:a16="http://schemas.microsoft.com/office/drawing/2014/main" val="4031248115"/>
                     </a:ext>
                   </a:extLst>
                 </a:gridCol>
                 <a:gridCol w="1354667">
                   <a:extLst>
                     <a:ext uri="{9D8B030D-6E8A-4147-A177-3AD203B41FA5}">
-                      <a16:colId xmlns:a16="http://schemas.microsoft.com/office/drawing/2014/main" xmlns="" val="220679877"/>
+                      <a16:colId xmlns:a16="http://schemas.microsoft.com/office/drawing/2014/main" val="220679877"/>
                     </a:ext>
                   </a:extLst>
                 </a:gridCol>
                 <a:gridCol w="1354667">
                   <a:extLst>
                     <a:ext uri="{9D8B030D-6E8A-4147-A177-3AD203B41FA5}">
-                      <a16:colId xmlns:a16="http://schemas.microsoft.com/office/drawing/2014/main" xmlns="" val="2773510325"/>
+                      <a16:colId xmlns:a16="http://schemas.microsoft.com/office/drawing/2014/main" val="2773510325"/>
                     </a:ext>
                   </a:extLst>
                 </a:gridCol>
                 <a:gridCol w="1354667">
                   <a:extLst>
                     <a:ext uri="{9D8B030D-6E8A-4147-A177-3AD203B41FA5}">
-                      <a16:colId xmlns:a16="http://schemas.microsoft.com/office/drawing/2014/main" xmlns="" val="269533158"/>
+                      <a16:colId xmlns:a16="http://schemas.microsoft.com/office/drawing/2014/main" val="269533158"/>
                     </a:ext>
                   </a:extLst>
                 </a:gridCol>
                 <a:gridCol w="1354667">
                   <a:extLst>
                     <a:ext uri="{9D8B030D-6E8A-4147-A177-3AD203B41FA5}">
-                      <a16:colId xmlns:a16="http://schemas.microsoft.com/office/drawing/2014/main" xmlns="" val="4000846733"/>
+                      <a16:colId xmlns:a16="http://schemas.microsoft.com/office/drawing/2014/main" val="4000846733"/>
                     </a:ext>
                   </a:extLst>
                 </a:gridCol>
                 <a:gridCol w="1354667">
                   <a:extLst>
                     <a:ext uri="{9D8B030D-6E8A-4147-A177-3AD203B41FA5}">
-                      <a16:colId xmlns:a16="http://schemas.microsoft.com/office/drawing/2014/main" xmlns="" val="465695325"/>
+                      <a16:colId xmlns:a16="http://schemas.microsoft.com/office/drawing/2014/main" val="465695325"/>
                     </a:ext>
                   </a:extLst>
                 </a:gridCol>
@@ -9766,7 +9861,7 @@
                 </a:tc>
                 <a:extLst>
                   <a:ext uri="{0D108BD9-81ED-4DB2-BD59-A6C34878D82A}">
-                    <a16:rowId xmlns:a16="http://schemas.microsoft.com/office/drawing/2014/main" xmlns="" val="1848507414"/>
+                    <a16:rowId xmlns:a16="http://schemas.microsoft.com/office/drawing/2014/main" val="1848507414"/>
                   </a:ext>
                 </a:extLst>
               </a:tr>
@@ -9856,7 +9951,7 @@
                 </a:tc>
                 <a:extLst>
                   <a:ext uri="{0D108BD9-81ED-4DB2-BD59-A6C34878D82A}">
-                    <a16:rowId xmlns:a16="http://schemas.microsoft.com/office/drawing/2014/main" xmlns="" val="3575386969"/>
+                    <a16:rowId xmlns:a16="http://schemas.microsoft.com/office/drawing/2014/main" val="3575386969"/>
                   </a:ext>
                 </a:extLst>
               </a:tr>
@@ -9950,7 +10045,7 @@
                 </a:tc>
                 <a:extLst>
                   <a:ext uri="{0D108BD9-81ED-4DB2-BD59-A6C34878D82A}">
-                    <a16:rowId xmlns:a16="http://schemas.microsoft.com/office/drawing/2014/main" xmlns="" val="4209900852"/>
+                    <a16:rowId xmlns:a16="http://schemas.microsoft.com/office/drawing/2014/main" val="4209900852"/>
                   </a:ext>
                 </a:extLst>
               </a:tr>
@@ -10036,7 +10131,7 @@
                 </a:tc>
                 <a:extLst>
                   <a:ext uri="{0D108BD9-81ED-4DB2-BD59-A6C34878D82A}">
-                    <a16:rowId xmlns:a16="http://schemas.microsoft.com/office/drawing/2014/main" xmlns="" val="2009515904"/>
+                    <a16:rowId xmlns:a16="http://schemas.microsoft.com/office/drawing/2014/main" val="2009515904"/>
                   </a:ext>
                 </a:extLst>
               </a:tr>
@@ -10181,7 +10276,7 @@
                 </a:tc>
                 <a:extLst>
                   <a:ext uri="{0D108BD9-81ED-4DB2-BD59-A6C34878D82A}">
-                    <a16:rowId xmlns:a16="http://schemas.microsoft.com/office/drawing/2014/main" xmlns="" val="3195264674"/>
+                    <a16:rowId xmlns:a16="http://schemas.microsoft.com/office/drawing/2014/main" val="3195264674"/>
                   </a:ext>
                 </a:extLst>
               </a:tr>
@@ -10386,14 +10481,14 @@
           <p:nvPr>
             <p:extLst>
               <p:ext uri="{D42A27DB-BD31-4B8C-83A1-F6EECF244321}">
-                <p14:modId xmlns:p14="http://schemas.microsoft.com/office/powerpoint/2010/main" val="3045225648"/>
+                <p14:modId xmlns:p14="http://schemas.microsoft.com/office/powerpoint/2010/main" val="805221244"/>
               </p:ext>
             </p:extLst>
           </p:nvPr>
         </p:nvGraphicFramePr>
         <p:xfrm>
-          <a:off x="1412240" y="1811400"/>
-          <a:ext cx="8107680" cy="3017520"/>
+          <a:off x="1412240" y="1934673"/>
+          <a:ext cx="8107680" cy="2707163"/>
         </p:xfrm>
         <a:graphic>
           <a:graphicData uri="http://schemas.openxmlformats.org/drawingml/2006/table">
@@ -10405,19 +10500,19 @@
                 <a:gridCol w="406400">
                   <a:extLst>
                     <a:ext uri="{9D8B030D-6E8A-4147-A177-3AD203B41FA5}">
-                      <a16:colId xmlns:a16="http://schemas.microsoft.com/office/drawing/2014/main" xmlns="" val="1801000517"/>
+                      <a16:colId xmlns:a16="http://schemas.microsoft.com/office/drawing/2014/main" val="1801000517"/>
                     </a:ext>
                   </a:extLst>
                 </a:gridCol>
                 <a:gridCol w="7701280">
                   <a:extLst>
                     <a:ext uri="{9D8B030D-6E8A-4147-A177-3AD203B41FA5}">
-                      <a16:colId xmlns:a16="http://schemas.microsoft.com/office/drawing/2014/main" xmlns="" val="1657204703"/>
+                      <a16:colId xmlns:a16="http://schemas.microsoft.com/office/drawing/2014/main" val="1657204703"/>
                     </a:ext>
                   </a:extLst>
                 </a:gridCol>
               </a:tblGrid>
-              <a:tr h="906043">
+              <a:tr h="604043">
                 <a:tc gridSpan="2">
                   <a:txBody>
                     <a:bodyPr/>
@@ -10433,21 +10528,13 @@
                       </a:r>
                       <a:r>
                         <a:rPr lang="es-ES" dirty="0" smtClean="0"/>
-                        <a:t> (arreglo)</a:t>
+                        <a:t> (arreglo</a:t>
+                      </a:r>
+                      <a:r>
+                        <a:rPr lang="es-ES" dirty="0" smtClean="0"/>
+                        <a:t>)</a:t>
                       </a:r>
                       <a:endParaRPr lang="es-ES" baseline="0" dirty="0" smtClean="0"/>
-                    </a:p>
-                    <a:p>
-                      <a:r>
-                        <a:rPr lang="es-ES" dirty="0" smtClean="0"/>
-                        <a:t>                MAX_VALUE</a:t>
-                      </a:r>
-                    </a:p>
-                    <a:p>
-                      <a:r>
-                        <a:rPr lang="es-ES" dirty="0" smtClean="0"/>
-                        <a:t>                MIN_VALUE</a:t>
-                      </a:r>
                     </a:p>
                   </a:txBody>
                   <a:tcPr/>
@@ -10464,11 +10551,11 @@
                 </a:tc>
                 <a:extLst>
                   <a:ext uri="{0D108BD9-81ED-4DB2-BD59-A6C34878D82A}">
-                    <a16:rowId xmlns:a16="http://schemas.microsoft.com/office/drawing/2014/main" xmlns="" val="1190365663"/>
+                    <a16:rowId xmlns:a16="http://schemas.microsoft.com/office/drawing/2014/main" val="1190365663"/>
                   </a:ext>
                 </a:extLst>
               </a:tr>
-              <a:tr h="342307">
+              <a:tr h="325680">
                 <a:tc gridSpan="2">
                   <a:txBody>
                     <a:bodyPr/>
@@ -10503,11 +10590,11 @@
                 </a:tc>
                 <a:extLst>
                   <a:ext uri="{0D108BD9-81ED-4DB2-BD59-A6C34878D82A}">
-                    <a16:rowId xmlns:a16="http://schemas.microsoft.com/office/drawing/2014/main" xmlns="" val="1730090890"/>
+                    <a16:rowId xmlns:a16="http://schemas.microsoft.com/office/drawing/2014/main" val="1730090890"/>
                   </a:ext>
                 </a:extLst>
               </a:tr>
-              <a:tr h="342307">
+              <a:tr h="325680">
                 <a:tc>
                   <a:txBody>
                     <a:bodyPr/>
@@ -10570,11 +10657,11 @@
                 </a:tc>
                 <a:extLst>
                   <a:ext uri="{0D108BD9-81ED-4DB2-BD59-A6C34878D82A}">
-                    <a16:rowId xmlns:a16="http://schemas.microsoft.com/office/drawing/2014/main" xmlns="" val="1626348320"/>
+                    <a16:rowId xmlns:a16="http://schemas.microsoft.com/office/drawing/2014/main" val="1626348320"/>
                   </a:ext>
                 </a:extLst>
               </a:tr>
-              <a:tr h="342307">
+              <a:tr h="569940">
                 <a:tc>
                   <a:txBody>
                     <a:bodyPr/>
@@ -10620,11 +10707,11 @@
                 </a:tc>
                 <a:extLst>
                   <a:ext uri="{0D108BD9-81ED-4DB2-BD59-A6C34878D82A}">
-                    <a16:rowId xmlns:a16="http://schemas.microsoft.com/office/drawing/2014/main" xmlns="" val="993100956"/>
+                    <a16:rowId xmlns:a16="http://schemas.microsoft.com/office/drawing/2014/main" val="993100956"/>
                   </a:ext>
                 </a:extLst>
               </a:tr>
-              <a:tr h="342307">
+              <a:tr h="325680">
                 <a:tc>
                   <a:txBody>
                     <a:bodyPr/>
@@ -10667,11 +10754,11 @@
                 </a:tc>
                 <a:extLst>
                   <a:ext uri="{0D108BD9-81ED-4DB2-BD59-A6C34878D82A}">
-                    <a16:rowId xmlns:a16="http://schemas.microsoft.com/office/drawing/2014/main" xmlns="" val="3588268998"/>
+                    <a16:rowId xmlns:a16="http://schemas.microsoft.com/office/drawing/2014/main" val="3588268998"/>
                   </a:ext>
                 </a:extLst>
               </a:tr>
-              <a:tr h="342307">
+              <a:tr h="325680">
                 <a:tc>
                   <a:txBody>
                     <a:bodyPr/>
@@ -10706,7 +10793,7 @@
                 </a:tc>
                 <a:extLst>
                   <a:ext uri="{0D108BD9-81ED-4DB2-BD59-A6C34878D82A}">
-                    <a16:rowId xmlns:a16="http://schemas.microsoft.com/office/drawing/2014/main" xmlns="" val="2826695688"/>
+                    <a16:rowId xmlns:a16="http://schemas.microsoft.com/office/drawing/2014/main" val="2826695688"/>
                   </a:ext>
                 </a:extLst>
               </a:tr>
@@ -11313,28 +11400,28 @@
                 <a:gridCol w="406400">
                   <a:extLst>
                     <a:ext uri="{9D8B030D-6E8A-4147-A177-3AD203B41FA5}">
-                      <a16:colId xmlns:a16="http://schemas.microsoft.com/office/drawing/2014/main" xmlns="" val="1801000517"/>
+                      <a16:colId xmlns:a16="http://schemas.microsoft.com/office/drawing/2014/main" val="1801000517"/>
                     </a:ext>
                   </a:extLst>
                 </a:gridCol>
                 <a:gridCol w="465328">
                   <a:extLst>
                     <a:ext uri="{9D8B030D-6E8A-4147-A177-3AD203B41FA5}">
-                      <a16:colId xmlns:a16="http://schemas.microsoft.com/office/drawing/2014/main" xmlns="" val="1657204703"/>
+                      <a16:colId xmlns:a16="http://schemas.microsoft.com/office/drawing/2014/main" val="1657204703"/>
                     </a:ext>
                   </a:extLst>
                 </a:gridCol>
                 <a:gridCol w="355600">
                   <a:extLst>
                     <a:ext uri="{9D8B030D-6E8A-4147-A177-3AD203B41FA5}">
-                      <a16:colId xmlns:a16="http://schemas.microsoft.com/office/drawing/2014/main" xmlns="" val="2374098939"/>
+                      <a16:colId xmlns:a16="http://schemas.microsoft.com/office/drawing/2014/main" val="2374098939"/>
                     </a:ext>
                   </a:extLst>
                 </a:gridCol>
                 <a:gridCol w="6880352">
                   <a:extLst>
                     <a:ext uri="{9D8B030D-6E8A-4147-A177-3AD203B41FA5}">
-                      <a16:colId xmlns:a16="http://schemas.microsoft.com/office/drawing/2014/main" xmlns="" val="76615332"/>
+                      <a16:colId xmlns:a16="http://schemas.microsoft.com/office/drawing/2014/main" val="76615332"/>
                     </a:ext>
                   </a:extLst>
                 </a:gridCol>
@@ -11392,7 +11479,7 @@
                 </a:tc>
                 <a:extLst>
                   <a:ext uri="{0D108BD9-81ED-4DB2-BD59-A6C34878D82A}">
-                    <a16:rowId xmlns:a16="http://schemas.microsoft.com/office/drawing/2014/main" xmlns="" val="1190365663"/>
+                    <a16:rowId xmlns:a16="http://schemas.microsoft.com/office/drawing/2014/main" val="1190365663"/>
                   </a:ext>
                 </a:extLst>
               </a:tr>
@@ -11451,7 +11538,7 @@
                 </a:tc>
                 <a:extLst>
                   <a:ext uri="{0D108BD9-81ED-4DB2-BD59-A6C34878D82A}">
-                    <a16:rowId xmlns:a16="http://schemas.microsoft.com/office/drawing/2014/main" xmlns="" val="1730090890"/>
+                    <a16:rowId xmlns:a16="http://schemas.microsoft.com/office/drawing/2014/main" val="1730090890"/>
                   </a:ext>
                 </a:extLst>
               </a:tr>
@@ -11523,7 +11610,7 @@
                 </a:tc>
                 <a:extLst>
                   <a:ext uri="{0D108BD9-81ED-4DB2-BD59-A6C34878D82A}">
-                    <a16:rowId xmlns:a16="http://schemas.microsoft.com/office/drawing/2014/main" xmlns="" val="1626348320"/>
+                    <a16:rowId xmlns:a16="http://schemas.microsoft.com/office/drawing/2014/main" val="1626348320"/>
                   </a:ext>
                 </a:extLst>
               </a:tr>
@@ -11599,7 +11686,7 @@
                 </a:tc>
                 <a:extLst>
                   <a:ext uri="{0D108BD9-81ED-4DB2-BD59-A6C34878D82A}">
-                    <a16:rowId xmlns:a16="http://schemas.microsoft.com/office/drawing/2014/main" xmlns="" val="993100956"/>
+                    <a16:rowId xmlns:a16="http://schemas.microsoft.com/office/drawing/2014/main" val="993100956"/>
                   </a:ext>
                 </a:extLst>
               </a:tr>
@@ -11662,7 +11749,7 @@
                 </a:tc>
                 <a:extLst>
                   <a:ext uri="{0D108BD9-81ED-4DB2-BD59-A6C34878D82A}">
-                    <a16:rowId xmlns:a16="http://schemas.microsoft.com/office/drawing/2014/main" xmlns="" val="3588268998"/>
+                    <a16:rowId xmlns:a16="http://schemas.microsoft.com/office/drawing/2014/main" val="3588268998"/>
                   </a:ext>
                 </a:extLst>
               </a:tr>
@@ -11717,7 +11804,7 @@
                 </a:tc>
                 <a:extLst>
                   <a:ext uri="{0D108BD9-81ED-4DB2-BD59-A6C34878D82A}">
-                    <a16:rowId xmlns:a16="http://schemas.microsoft.com/office/drawing/2014/main" xmlns="" val="2137013417"/>
+                    <a16:rowId xmlns:a16="http://schemas.microsoft.com/office/drawing/2014/main" val="2137013417"/>
                   </a:ext>
                 </a:extLst>
               </a:tr>
@@ -11772,7 +11859,7 @@
                 </a:tc>
                 <a:extLst>
                   <a:ext uri="{0D108BD9-81ED-4DB2-BD59-A6C34878D82A}">
-                    <a16:rowId xmlns:a16="http://schemas.microsoft.com/office/drawing/2014/main" xmlns="" val="3367745634"/>
+                    <a16:rowId xmlns:a16="http://schemas.microsoft.com/office/drawing/2014/main" val="3367745634"/>
                   </a:ext>
                 </a:extLst>
               </a:tr>
@@ -11827,7 +11914,7 @@
                 </a:tc>
                 <a:extLst>
                   <a:ext uri="{0D108BD9-81ED-4DB2-BD59-A6C34878D82A}">
-                    <a16:rowId xmlns:a16="http://schemas.microsoft.com/office/drawing/2014/main" xmlns="" val="2048022435"/>
+                    <a16:rowId xmlns:a16="http://schemas.microsoft.com/office/drawing/2014/main" val="2048022435"/>
                   </a:ext>
                 </a:extLst>
               </a:tr>
@@ -11886,7 +11973,7 @@
                 </a:tc>
                 <a:extLst>
                   <a:ext uri="{0D108BD9-81ED-4DB2-BD59-A6C34878D82A}">
-                    <a16:rowId xmlns:a16="http://schemas.microsoft.com/office/drawing/2014/main" xmlns="" val="2826695688"/>
+                    <a16:rowId xmlns:a16="http://schemas.microsoft.com/office/drawing/2014/main" val="2826695688"/>
                   </a:ext>
                 </a:extLst>
               </a:tr>

</xml_diff>

<commit_message>
feat: update pdf version 6
</commit_message>
<xml_diff>
--- a/ppt/MH_Laura_Javier T2.pptx
+++ b/ppt/MH_Laura_Javier T2.pptx
@@ -20,8 +20,8 @@
     <p:sldId id="275" r:id="rId11"/>
     <p:sldId id="268" r:id="rId12"/>
     <p:sldId id="269" r:id="rId13"/>
-    <p:sldId id="267" r:id="rId14"/>
-    <p:sldId id="279" r:id="rId15"/>
+    <p:sldId id="279" r:id="rId14"/>
+    <p:sldId id="267" r:id="rId15"/>
     <p:sldId id="271" r:id="rId16"/>
     <p:sldId id="278" r:id="rId17"/>
   </p:sldIdLst>
@@ -143,458 +143,9 @@
 </file>
 
 <file path=ppt/charts/chart1.xml><?xml version="1.0" encoding="utf-8"?>
-<c:chartSpace xmlns:c="http://schemas.openxmlformats.org/drawingml/2006/chart" xmlns:a="http://schemas.openxmlformats.org/drawingml/2006/main" xmlns:r="http://schemas.openxmlformats.org/officeDocument/2006/relationships">
+<c:chartSpace xmlns:c="http://schemas.openxmlformats.org/drawingml/2006/chart" xmlns:a="http://schemas.openxmlformats.org/drawingml/2006/main" xmlns:r="http://schemas.openxmlformats.org/officeDocument/2006/relationships" xmlns:c16r2="http://schemas.microsoft.com/office/drawing/2015/06/chart">
   <c:date1904 val="0"/>
-  <c:lang val="es-ES"/>
-  <c:roundedCorners val="0"/>
-  <mc:AlternateContent xmlns:mc="http://schemas.openxmlformats.org/markup-compatibility/2006">
-    <mc:Choice xmlns:c14="http://schemas.microsoft.com/office/drawing/2007/8/2/chart" Requires="c14">
-      <c14:style val="102"/>
-    </mc:Choice>
-    <mc:Fallback>
-      <c:style val="2"/>
-    </mc:Fallback>
-  </mc:AlternateContent>
-  <c:clrMapOvr bg1="lt1" tx1="dk1" bg2="lt2" tx2="dk2" accent1="accent1" accent2="accent2" accent3="accent3" accent4="accent4" accent5="accent5" accent6="accent6" hlink="hlink" folHlink="folHlink"/>
-  <c:chart>
-    <c:autoTitleDeleted val="1"/>
-    <c:plotArea>
-      <c:layout>
-        <c:manualLayout>
-          <c:layoutTarget val="inner"/>
-          <c:xMode val="edge"/>
-          <c:yMode val="edge"/>
-          <c:x val="3.1682352370861297E-2"/>
-          <c:y val="9.2861409796893682E-2"/>
-          <c:w val="0.93313734859659692"/>
-          <c:h val="0.75160279024261756"/>
-        </c:manualLayout>
-      </c:layout>
-      <c:barChart>
-        <c:barDir val="col"/>
-        <c:grouping val="clustered"/>
-        <c:varyColors val="0"/>
-        <c:ser>
-          <c:idx val="0"/>
-          <c:order val="0"/>
-          <c:tx>
-            <c:strRef>
-              <c:f>Hoja1!$D$7</c:f>
-              <c:strCache>
-                <c:ptCount val="1"/>
-                <c:pt idx="0">
-                  <c:v>STEP 0.1</c:v>
-                </c:pt>
-              </c:strCache>
-            </c:strRef>
-          </c:tx>
-          <c:spPr>
-            <a:solidFill>
-              <a:schemeClr val="accent1"/>
-            </a:solidFill>
-            <a:ln>
-              <a:noFill/>
-            </a:ln>
-            <a:effectLst/>
-          </c:spPr>
-          <c:invertIfNegative val="0"/>
-          <c:cat>
-            <c:strRef>
-              <c:f>Hoja1!$C$8:$C$12</c:f>
-              <c:strCache>
-                <c:ptCount val="5"/>
-                <c:pt idx="0">
-                  <c:v>Búsqueda Aleatoria</c:v>
-                </c:pt>
-                <c:pt idx="1">
-                  <c:v>Camino Aleatorio</c:v>
-                </c:pt>
-                <c:pt idx="2">
-                  <c:v>Escalador de Colinas</c:v>
-                </c:pt>
-                <c:pt idx="3">
-                  <c:v>Algoritmo Genético</c:v>
-                </c:pt>
-                <c:pt idx="4">
-                  <c:v>Estrategia Evolutiva</c:v>
-                </c:pt>
-              </c:strCache>
-            </c:strRef>
-          </c:cat>
-          <c:val>
-            <c:numRef>
-              <c:f>Hoja1!$D$8:$D$12</c:f>
-              <c:numCache>
-                <c:formatCode>General</c:formatCode>
-                <c:ptCount val="5"/>
-                <c:pt idx="0">
-                  <c:v>0.8</c:v>
-                </c:pt>
-                <c:pt idx="1">
-                  <c:v>0.59</c:v>
-                </c:pt>
-                <c:pt idx="2">
-                  <c:v>1.0900000000000001</c:v>
-                </c:pt>
-                <c:pt idx="3">
-                  <c:v>1.2</c:v>
-                </c:pt>
-                <c:pt idx="4">
-                  <c:v>0.59</c:v>
-                </c:pt>
-              </c:numCache>
-            </c:numRef>
-          </c:val>
-          <c:extLst xmlns:c16r2="http://schemas.microsoft.com/office/drawing/2015/06/chart">
-            <c:ext xmlns:c16="http://schemas.microsoft.com/office/drawing/2014/chart" uri="{C3380CC4-5D6E-409C-BE32-E72D297353CC}">
-              <c16:uniqueId val="{00000000-D186-4498-9989-EA998F9CE702}"/>
-            </c:ext>
-          </c:extLst>
-        </c:ser>
-        <c:ser>
-          <c:idx val="1"/>
-          <c:order val="1"/>
-          <c:tx>
-            <c:strRef>
-              <c:f>Hoja1!$E$7</c:f>
-              <c:strCache>
-                <c:ptCount val="1"/>
-                <c:pt idx="0">
-                  <c:v>STEP 0.2</c:v>
-                </c:pt>
-              </c:strCache>
-            </c:strRef>
-          </c:tx>
-          <c:spPr>
-            <a:solidFill>
-              <a:schemeClr val="accent2"/>
-            </a:solidFill>
-            <a:ln>
-              <a:noFill/>
-            </a:ln>
-            <a:effectLst/>
-          </c:spPr>
-          <c:invertIfNegative val="0"/>
-          <c:cat>
-            <c:strRef>
-              <c:f>Hoja1!$C$8:$C$12</c:f>
-              <c:strCache>
-                <c:ptCount val="5"/>
-                <c:pt idx="0">
-                  <c:v>Búsqueda Aleatoria</c:v>
-                </c:pt>
-                <c:pt idx="1">
-                  <c:v>Camino Aleatorio</c:v>
-                </c:pt>
-                <c:pt idx="2">
-                  <c:v>Escalador de Colinas</c:v>
-                </c:pt>
-                <c:pt idx="3">
-                  <c:v>Algoritmo Genético</c:v>
-                </c:pt>
-                <c:pt idx="4">
-                  <c:v>Estrategia Evolutiva</c:v>
-                </c:pt>
-              </c:strCache>
-            </c:strRef>
-          </c:cat>
-          <c:val>
-            <c:numRef>
-              <c:f>Hoja1!$E$8:$E$12</c:f>
-              <c:numCache>
-                <c:formatCode>General</c:formatCode>
-                <c:ptCount val="5"/>
-                <c:pt idx="0">
-                  <c:v>0.4</c:v>
-                </c:pt>
-                <c:pt idx="1">
-                  <c:v>0.59</c:v>
-                </c:pt>
-                <c:pt idx="2">
-                  <c:v>3.6</c:v>
-                </c:pt>
-                <c:pt idx="3">
-                  <c:v>3.6</c:v>
-                </c:pt>
-                <c:pt idx="4">
-                  <c:v>0.99</c:v>
-                </c:pt>
-              </c:numCache>
-            </c:numRef>
-          </c:val>
-          <c:extLst xmlns:c16r2="http://schemas.microsoft.com/office/drawing/2015/06/chart">
-            <c:ext xmlns:c16="http://schemas.microsoft.com/office/drawing/2014/chart" uri="{C3380CC4-5D6E-409C-BE32-E72D297353CC}">
-              <c16:uniqueId val="{00000001-D186-4498-9989-EA998F9CE702}"/>
-            </c:ext>
-          </c:extLst>
-        </c:ser>
-        <c:ser>
-          <c:idx val="2"/>
-          <c:order val="2"/>
-          <c:tx>
-            <c:strRef>
-              <c:f>Hoja1!$F$7</c:f>
-              <c:strCache>
-                <c:ptCount val="1"/>
-                <c:pt idx="0">
-                  <c:v>STEP 0.3</c:v>
-                </c:pt>
-              </c:strCache>
-            </c:strRef>
-          </c:tx>
-          <c:spPr>
-            <a:solidFill>
-              <a:schemeClr val="accent3"/>
-            </a:solidFill>
-            <a:ln>
-              <a:noFill/>
-            </a:ln>
-            <a:effectLst/>
-          </c:spPr>
-          <c:invertIfNegative val="0"/>
-          <c:cat>
-            <c:strRef>
-              <c:f>Hoja1!$C$8:$C$12</c:f>
-              <c:strCache>
-                <c:ptCount val="5"/>
-                <c:pt idx="0">
-                  <c:v>Búsqueda Aleatoria</c:v>
-                </c:pt>
-                <c:pt idx="1">
-                  <c:v>Camino Aleatorio</c:v>
-                </c:pt>
-                <c:pt idx="2">
-                  <c:v>Escalador de Colinas</c:v>
-                </c:pt>
-                <c:pt idx="3">
-                  <c:v>Algoritmo Genético</c:v>
-                </c:pt>
-                <c:pt idx="4">
-                  <c:v>Estrategia Evolutiva</c:v>
-                </c:pt>
-              </c:strCache>
-            </c:strRef>
-          </c:cat>
-          <c:val>
-            <c:numRef>
-              <c:f>Hoja1!$F$8:$F$12</c:f>
-              <c:numCache>
-                <c:formatCode>General</c:formatCode>
-                <c:ptCount val="5"/>
-                <c:pt idx="0">
-                  <c:v>0.89</c:v>
-                </c:pt>
-                <c:pt idx="1">
-                  <c:v>0.19</c:v>
-                </c:pt>
-                <c:pt idx="2">
-                  <c:v>7.2</c:v>
-                </c:pt>
-                <c:pt idx="3">
-                  <c:v>1.69</c:v>
-                </c:pt>
-                <c:pt idx="4">
-                  <c:v>0.9</c:v>
-                </c:pt>
-              </c:numCache>
-            </c:numRef>
-          </c:val>
-          <c:extLst xmlns:c16r2="http://schemas.microsoft.com/office/drawing/2015/06/chart">
-            <c:ext xmlns:c16="http://schemas.microsoft.com/office/drawing/2014/chart" uri="{C3380CC4-5D6E-409C-BE32-E72D297353CC}">
-              <c16:uniqueId val="{00000002-D186-4498-9989-EA998F9CE702}"/>
-            </c:ext>
-          </c:extLst>
-        </c:ser>
-        <c:dLbls>
-          <c:showLegendKey val="0"/>
-          <c:showVal val="0"/>
-          <c:showCatName val="0"/>
-          <c:showSerName val="0"/>
-          <c:showPercent val="0"/>
-          <c:showBubbleSize val="0"/>
-        </c:dLbls>
-        <c:gapWidth val="219"/>
-        <c:overlap val="-27"/>
-        <c:axId val="299487216"/>
-        <c:axId val="299494664"/>
-      </c:barChart>
-      <c:catAx>
-        <c:axId val="299487216"/>
-        <c:scaling>
-          <c:orientation val="minMax"/>
-        </c:scaling>
-        <c:delete val="0"/>
-        <c:axPos val="b"/>
-        <c:numFmt formatCode="General" sourceLinked="1"/>
-        <c:majorTickMark val="none"/>
-        <c:minorTickMark val="none"/>
-        <c:tickLblPos val="nextTo"/>
-        <c:spPr>
-          <a:noFill/>
-          <a:ln w="9525" cap="flat" cmpd="sng" algn="ctr">
-            <a:solidFill>
-              <a:schemeClr val="tx1">
-                <a:lumMod val="15000"/>
-                <a:lumOff val="85000"/>
-              </a:schemeClr>
-            </a:solidFill>
-            <a:round/>
-          </a:ln>
-          <a:effectLst/>
-        </c:spPr>
-        <c:txPr>
-          <a:bodyPr rot="-60000000" spcFirstLastPara="1" vertOverflow="ellipsis" vert="horz" wrap="square" anchor="ctr" anchorCtr="1"/>
-          <a:lstStyle/>
-          <a:p>
-            <a:pPr>
-              <a:defRPr sz="1200" b="0" i="0" u="none" strike="noStrike" kern="1200" baseline="0">
-                <a:solidFill>
-                  <a:schemeClr val="tx1">
-                    <a:lumMod val="65000"/>
-                    <a:lumOff val="35000"/>
-                  </a:schemeClr>
-                </a:solidFill>
-                <a:latin typeface="+mn-lt"/>
-                <a:ea typeface="+mn-ea"/>
-                <a:cs typeface="+mn-cs"/>
-              </a:defRPr>
-            </a:pPr>
-            <a:endParaRPr lang="es-ES"/>
-          </a:p>
-        </c:txPr>
-        <c:crossAx val="299494664"/>
-        <c:crosses val="autoZero"/>
-        <c:auto val="1"/>
-        <c:lblAlgn val="ctr"/>
-        <c:lblOffset val="100"/>
-        <c:noMultiLvlLbl val="0"/>
-      </c:catAx>
-      <c:valAx>
-        <c:axId val="299494664"/>
-        <c:scaling>
-          <c:orientation val="minMax"/>
-        </c:scaling>
-        <c:delete val="0"/>
-        <c:axPos val="l"/>
-        <c:majorGridlines>
-          <c:spPr>
-            <a:ln w="9525" cap="flat" cmpd="sng" algn="ctr">
-              <a:solidFill>
-                <a:schemeClr val="tx1">
-                  <a:lumMod val="15000"/>
-                  <a:lumOff val="85000"/>
-                </a:schemeClr>
-              </a:solidFill>
-              <a:round/>
-            </a:ln>
-            <a:effectLst/>
-          </c:spPr>
-        </c:majorGridlines>
-        <c:numFmt formatCode="General" sourceLinked="1"/>
-        <c:majorTickMark val="none"/>
-        <c:minorTickMark val="none"/>
-        <c:tickLblPos val="nextTo"/>
-        <c:spPr>
-          <a:noFill/>
-          <a:ln>
-            <a:noFill/>
-          </a:ln>
-          <a:effectLst/>
-        </c:spPr>
-        <c:txPr>
-          <a:bodyPr rot="-60000000" spcFirstLastPara="1" vertOverflow="ellipsis" vert="horz" wrap="square" anchor="ctr" anchorCtr="1"/>
-          <a:lstStyle/>
-          <a:p>
-            <a:pPr>
-              <a:defRPr sz="900" b="0" i="0" u="none" strike="noStrike" kern="1200" baseline="0">
-                <a:solidFill>
-                  <a:schemeClr val="tx1">
-                    <a:lumMod val="65000"/>
-                    <a:lumOff val="35000"/>
-                  </a:schemeClr>
-                </a:solidFill>
-                <a:latin typeface="+mn-lt"/>
-                <a:ea typeface="+mn-ea"/>
-                <a:cs typeface="+mn-cs"/>
-              </a:defRPr>
-            </a:pPr>
-            <a:endParaRPr lang="es-ES"/>
-          </a:p>
-        </c:txPr>
-        <c:crossAx val="299487216"/>
-        <c:crosses val="autoZero"/>
-        <c:crossBetween val="between"/>
-      </c:valAx>
-      <c:spPr>
-        <a:noFill/>
-        <a:ln>
-          <a:noFill/>
-        </a:ln>
-        <a:effectLst/>
-      </c:spPr>
-    </c:plotArea>
-    <c:legend>
-      <c:legendPos val="b"/>
-      <c:overlay val="0"/>
-      <c:spPr>
-        <a:noFill/>
-        <a:ln>
-          <a:noFill/>
-        </a:ln>
-        <a:effectLst/>
-      </c:spPr>
-      <c:txPr>
-        <a:bodyPr rot="0" spcFirstLastPara="1" vertOverflow="ellipsis" vert="horz" wrap="square" anchor="ctr" anchorCtr="1"/>
-        <a:lstStyle/>
-        <a:p>
-          <a:pPr>
-            <a:defRPr sz="1200" b="0" i="0" u="none" strike="noStrike" kern="1200" baseline="0">
-              <a:solidFill>
-                <a:schemeClr val="tx1">
-                  <a:lumMod val="65000"/>
-                  <a:lumOff val="35000"/>
-                </a:schemeClr>
-              </a:solidFill>
-              <a:latin typeface="+mn-lt"/>
-              <a:ea typeface="+mn-ea"/>
-              <a:cs typeface="+mn-cs"/>
-            </a:defRPr>
-          </a:pPr>
-          <a:endParaRPr lang="es-ES"/>
-        </a:p>
-      </c:txPr>
-    </c:legend>
-    <c:plotVisOnly val="1"/>
-    <c:dispBlanksAs val="gap"/>
-    <c:showDLblsOverMax val="0"/>
-  </c:chart>
-  <c:spPr>
-    <a:noFill/>
-    <a:ln>
-      <a:noFill/>
-    </a:ln>
-    <a:effectLst/>
-  </c:spPr>
-  <c:txPr>
-    <a:bodyPr/>
-    <a:lstStyle/>
-    <a:p>
-      <a:pPr>
-        <a:defRPr/>
-      </a:pPr>
-      <a:endParaRPr lang="es-ES"/>
-    </a:p>
-  </c:txPr>
-  <c:externalData r:id="rId4">
-    <c:autoUpdate val="0"/>
-  </c:externalData>
-</c:chartSpace>
-</file>
-
-<file path=ppt/charts/chart2.xml><?xml version="1.0" encoding="utf-8"?>
-<c:chartSpace xmlns:c="http://schemas.openxmlformats.org/drawingml/2006/chart" xmlns:a="http://schemas.openxmlformats.org/drawingml/2006/main" xmlns:r="http://schemas.openxmlformats.org/officeDocument/2006/relationships">
-  <c:date1904 val="0"/>
-  <c:lang val="es-ES"/>
+  <c:lang val="en-US"/>
   <c:roundedCorners val="0"/>
   <mc:AlternateContent xmlns:mc="http://schemas.openxmlformats.org/markup-compatibility/2006">
     <mc:Choice xmlns:c14="http://schemas.microsoft.com/office/drawing/2007/8/2/chart" Requires="c14">
@@ -607,7 +158,14 @@
   <c:clrMapOvr bg1="lt1" tx1="dk1" bg2="lt2" tx2="dk2" accent1="accent1" accent2="accent2" accent3="accent3" accent4="accent4" accent5="accent5" accent6="accent6" hlink="hlink" folHlink="folHlink"/>
   <c:chart>
     <c:title>
-      <c:layout/>
+      <c:layout>
+        <c:manualLayout>
+          <c:xMode val="edge"/>
+          <c:yMode val="edge"/>
+          <c:x val="2.0318905952078862E-2"/>
+          <c:y val="4.1578106624692579E-2"/>
+        </c:manualLayout>
+      </c:layout>
       <c:overlay val="0"/>
       <c:spPr>
         <a:noFill/>
@@ -743,6 +301,11 @@
               </c:numCache>
             </c:numRef>
           </c:val>
+          <c:extLst>
+            <c:ext xmlns:c16="http://schemas.microsoft.com/office/drawing/2014/chart" uri="{C3380CC4-5D6E-409C-BE32-E72D297353CC}">
+              <c16:uniqueId val="{00000000-CDA6-49BC-B759-87EB331A7874}"/>
+            </c:ext>
+          </c:extLst>
         </c:ser>
         <c:dLbls>
           <c:showLegendKey val="0"/>
@@ -781,7 +344,7 @@
           <a:lstStyle/>
           <a:p>
             <a:pPr>
-              <a:defRPr sz="900" b="0" i="0" u="none" strike="noStrike" kern="1200" baseline="0">
+              <a:defRPr sz="1100" b="0" i="0" u="none" strike="noStrike" kern="1200" baseline="0">
                 <a:solidFill>
                   <a:schemeClr val="tx1">
                     <a:lumMod val="65000"/>
@@ -867,6 +430,456 @@
         <a:effectLst/>
       </c:spPr>
     </c:plotArea>
+    <c:plotVisOnly val="1"/>
+    <c:dispBlanksAs val="gap"/>
+    <c:showDLblsOverMax val="0"/>
+  </c:chart>
+  <c:spPr>
+    <a:noFill/>
+    <a:ln>
+      <a:noFill/>
+    </a:ln>
+    <a:effectLst/>
+  </c:spPr>
+  <c:txPr>
+    <a:bodyPr/>
+    <a:lstStyle/>
+    <a:p>
+      <a:pPr>
+        <a:defRPr/>
+      </a:pPr>
+      <a:endParaRPr lang="es-ES"/>
+    </a:p>
+  </c:txPr>
+  <c:externalData r:id="rId4">
+    <c:autoUpdate val="0"/>
+  </c:externalData>
+</c:chartSpace>
+</file>
+
+<file path=ppt/charts/chart2.xml><?xml version="1.0" encoding="utf-8"?>
+<c:chartSpace xmlns:c="http://schemas.openxmlformats.org/drawingml/2006/chart" xmlns:a="http://schemas.openxmlformats.org/drawingml/2006/main" xmlns:r="http://schemas.openxmlformats.org/officeDocument/2006/relationships" xmlns:c16r2="http://schemas.microsoft.com/office/drawing/2015/06/chart">
+  <c:date1904 val="0"/>
+  <c:lang val="en-US"/>
+  <c:roundedCorners val="0"/>
+  <mc:AlternateContent xmlns:mc="http://schemas.openxmlformats.org/markup-compatibility/2006">
+    <mc:Choice xmlns:c14="http://schemas.microsoft.com/office/drawing/2007/8/2/chart" Requires="c14">
+      <c14:style val="102"/>
+    </mc:Choice>
+    <mc:Fallback>
+      <c:style val="2"/>
+    </mc:Fallback>
+  </mc:AlternateContent>
+  <c:clrMapOvr bg1="lt1" tx1="dk1" bg2="lt2" tx2="dk2" accent1="accent1" accent2="accent2" accent3="accent3" accent4="accent4" accent5="accent5" accent6="accent6" hlink="hlink" folHlink="folHlink"/>
+  <c:chart>
+    <c:autoTitleDeleted val="1"/>
+    <c:plotArea>
+      <c:layout>
+        <c:manualLayout>
+          <c:layoutTarget val="inner"/>
+          <c:xMode val="edge"/>
+          <c:yMode val="edge"/>
+          <c:x val="3.1682352370861297E-2"/>
+          <c:y val="9.2861409796893682E-2"/>
+          <c:w val="0.93313734859659692"/>
+          <c:h val="0.75160279024261756"/>
+        </c:manualLayout>
+      </c:layout>
+      <c:barChart>
+        <c:barDir val="col"/>
+        <c:grouping val="clustered"/>
+        <c:varyColors val="0"/>
+        <c:ser>
+          <c:idx val="0"/>
+          <c:order val="0"/>
+          <c:tx>
+            <c:strRef>
+              <c:f>Hoja1!$D$7</c:f>
+              <c:strCache>
+                <c:ptCount val="1"/>
+                <c:pt idx="0">
+                  <c:v>STEP 0.1</c:v>
+                </c:pt>
+              </c:strCache>
+            </c:strRef>
+          </c:tx>
+          <c:spPr>
+            <a:solidFill>
+              <a:schemeClr val="accent1"/>
+            </a:solidFill>
+            <a:ln>
+              <a:noFill/>
+            </a:ln>
+            <a:effectLst/>
+          </c:spPr>
+          <c:invertIfNegative val="0"/>
+          <c:cat>
+            <c:strRef>
+              <c:f>Hoja1!$C$8:$C$12</c:f>
+              <c:strCache>
+                <c:ptCount val="5"/>
+                <c:pt idx="0">
+                  <c:v>Búsqueda Aleatoria</c:v>
+                </c:pt>
+                <c:pt idx="1">
+                  <c:v>Camino Aleatorio</c:v>
+                </c:pt>
+                <c:pt idx="2">
+                  <c:v>Escalador de Colinas</c:v>
+                </c:pt>
+                <c:pt idx="3">
+                  <c:v>Algoritmo Genético</c:v>
+                </c:pt>
+                <c:pt idx="4">
+                  <c:v>Estrategia Evolutiva</c:v>
+                </c:pt>
+              </c:strCache>
+            </c:strRef>
+          </c:cat>
+          <c:val>
+            <c:numRef>
+              <c:f>Hoja1!$D$8:$D$12</c:f>
+              <c:numCache>
+                <c:formatCode>General</c:formatCode>
+                <c:ptCount val="5"/>
+                <c:pt idx="0">
+                  <c:v>0.8</c:v>
+                </c:pt>
+                <c:pt idx="1">
+                  <c:v>0.59</c:v>
+                </c:pt>
+                <c:pt idx="2">
+                  <c:v>1.0900000000000001</c:v>
+                </c:pt>
+                <c:pt idx="3">
+                  <c:v>1.2</c:v>
+                </c:pt>
+                <c:pt idx="4">
+                  <c:v>0.59</c:v>
+                </c:pt>
+              </c:numCache>
+            </c:numRef>
+          </c:val>
+          <c:extLst>
+            <c:ext xmlns:c16="http://schemas.microsoft.com/office/drawing/2014/chart" uri="{C3380CC4-5D6E-409C-BE32-E72D297353CC}">
+              <c16:uniqueId val="{00000000-D186-4498-9989-EA998F9CE702}"/>
+            </c:ext>
+          </c:extLst>
+        </c:ser>
+        <c:ser>
+          <c:idx val="1"/>
+          <c:order val="1"/>
+          <c:tx>
+            <c:strRef>
+              <c:f>Hoja1!$E$7</c:f>
+              <c:strCache>
+                <c:ptCount val="1"/>
+                <c:pt idx="0">
+                  <c:v>STEP 0.2</c:v>
+                </c:pt>
+              </c:strCache>
+            </c:strRef>
+          </c:tx>
+          <c:spPr>
+            <a:solidFill>
+              <a:schemeClr val="accent2"/>
+            </a:solidFill>
+            <a:ln>
+              <a:noFill/>
+            </a:ln>
+            <a:effectLst/>
+          </c:spPr>
+          <c:invertIfNegative val="0"/>
+          <c:cat>
+            <c:strRef>
+              <c:f>Hoja1!$C$8:$C$12</c:f>
+              <c:strCache>
+                <c:ptCount val="5"/>
+                <c:pt idx="0">
+                  <c:v>Búsqueda Aleatoria</c:v>
+                </c:pt>
+                <c:pt idx="1">
+                  <c:v>Camino Aleatorio</c:v>
+                </c:pt>
+                <c:pt idx="2">
+                  <c:v>Escalador de Colinas</c:v>
+                </c:pt>
+                <c:pt idx="3">
+                  <c:v>Algoritmo Genético</c:v>
+                </c:pt>
+                <c:pt idx="4">
+                  <c:v>Estrategia Evolutiva</c:v>
+                </c:pt>
+              </c:strCache>
+            </c:strRef>
+          </c:cat>
+          <c:val>
+            <c:numRef>
+              <c:f>Hoja1!$E$8:$E$12</c:f>
+              <c:numCache>
+                <c:formatCode>General</c:formatCode>
+                <c:ptCount val="5"/>
+                <c:pt idx="0">
+                  <c:v>0.4</c:v>
+                </c:pt>
+                <c:pt idx="1">
+                  <c:v>0.59</c:v>
+                </c:pt>
+                <c:pt idx="2">
+                  <c:v>3.6</c:v>
+                </c:pt>
+                <c:pt idx="3">
+                  <c:v>3.6</c:v>
+                </c:pt>
+                <c:pt idx="4">
+                  <c:v>0.99</c:v>
+                </c:pt>
+              </c:numCache>
+            </c:numRef>
+          </c:val>
+          <c:extLst>
+            <c:ext xmlns:c16="http://schemas.microsoft.com/office/drawing/2014/chart" uri="{C3380CC4-5D6E-409C-BE32-E72D297353CC}">
+              <c16:uniqueId val="{00000001-D186-4498-9989-EA998F9CE702}"/>
+            </c:ext>
+          </c:extLst>
+        </c:ser>
+        <c:ser>
+          <c:idx val="2"/>
+          <c:order val="2"/>
+          <c:tx>
+            <c:strRef>
+              <c:f>Hoja1!$F$7</c:f>
+              <c:strCache>
+                <c:ptCount val="1"/>
+                <c:pt idx="0">
+                  <c:v>STEP 0.3</c:v>
+                </c:pt>
+              </c:strCache>
+            </c:strRef>
+          </c:tx>
+          <c:spPr>
+            <a:solidFill>
+              <a:schemeClr val="accent3"/>
+            </a:solidFill>
+            <a:ln>
+              <a:noFill/>
+            </a:ln>
+            <a:effectLst/>
+          </c:spPr>
+          <c:invertIfNegative val="0"/>
+          <c:cat>
+            <c:strRef>
+              <c:f>Hoja1!$C$8:$C$12</c:f>
+              <c:strCache>
+                <c:ptCount val="5"/>
+                <c:pt idx="0">
+                  <c:v>Búsqueda Aleatoria</c:v>
+                </c:pt>
+                <c:pt idx="1">
+                  <c:v>Camino Aleatorio</c:v>
+                </c:pt>
+                <c:pt idx="2">
+                  <c:v>Escalador de Colinas</c:v>
+                </c:pt>
+                <c:pt idx="3">
+                  <c:v>Algoritmo Genético</c:v>
+                </c:pt>
+                <c:pt idx="4">
+                  <c:v>Estrategia Evolutiva</c:v>
+                </c:pt>
+              </c:strCache>
+            </c:strRef>
+          </c:cat>
+          <c:val>
+            <c:numRef>
+              <c:f>Hoja1!$F$8:$F$12</c:f>
+              <c:numCache>
+                <c:formatCode>General</c:formatCode>
+                <c:ptCount val="5"/>
+                <c:pt idx="0">
+                  <c:v>0.89</c:v>
+                </c:pt>
+                <c:pt idx="1">
+                  <c:v>0.19</c:v>
+                </c:pt>
+                <c:pt idx="2">
+                  <c:v>7.2</c:v>
+                </c:pt>
+                <c:pt idx="3">
+                  <c:v>1.69</c:v>
+                </c:pt>
+                <c:pt idx="4">
+                  <c:v>0.9</c:v>
+                </c:pt>
+              </c:numCache>
+            </c:numRef>
+          </c:val>
+          <c:extLst>
+            <c:ext xmlns:c16="http://schemas.microsoft.com/office/drawing/2014/chart" uri="{C3380CC4-5D6E-409C-BE32-E72D297353CC}">
+              <c16:uniqueId val="{00000002-D186-4498-9989-EA998F9CE702}"/>
+            </c:ext>
+          </c:extLst>
+        </c:ser>
+        <c:dLbls>
+          <c:showLegendKey val="0"/>
+          <c:showVal val="0"/>
+          <c:showCatName val="0"/>
+          <c:showSerName val="0"/>
+          <c:showPercent val="0"/>
+          <c:showBubbleSize val="0"/>
+        </c:dLbls>
+        <c:gapWidth val="219"/>
+        <c:overlap val="-27"/>
+        <c:axId val="299487216"/>
+        <c:axId val="299494664"/>
+      </c:barChart>
+      <c:catAx>
+        <c:axId val="299487216"/>
+        <c:scaling>
+          <c:orientation val="minMax"/>
+        </c:scaling>
+        <c:delete val="0"/>
+        <c:axPos val="b"/>
+        <c:numFmt formatCode="General" sourceLinked="1"/>
+        <c:majorTickMark val="none"/>
+        <c:minorTickMark val="none"/>
+        <c:tickLblPos val="nextTo"/>
+        <c:spPr>
+          <a:noFill/>
+          <a:ln w="9525" cap="flat" cmpd="sng" algn="ctr">
+            <a:solidFill>
+              <a:schemeClr val="tx1">
+                <a:lumMod val="15000"/>
+                <a:lumOff val="85000"/>
+              </a:schemeClr>
+            </a:solidFill>
+            <a:round/>
+          </a:ln>
+          <a:effectLst/>
+        </c:spPr>
+        <c:txPr>
+          <a:bodyPr rot="-60000000" spcFirstLastPara="1" vertOverflow="ellipsis" vert="horz" wrap="square" anchor="ctr" anchorCtr="1"/>
+          <a:lstStyle/>
+          <a:p>
+            <a:pPr>
+              <a:defRPr sz="1200" b="0" i="0" u="none" strike="noStrike" kern="1200" baseline="0">
+                <a:solidFill>
+                  <a:schemeClr val="tx1">
+                    <a:lumMod val="65000"/>
+                    <a:lumOff val="35000"/>
+                  </a:schemeClr>
+                </a:solidFill>
+                <a:latin typeface="+mn-lt"/>
+                <a:ea typeface="+mn-ea"/>
+                <a:cs typeface="+mn-cs"/>
+              </a:defRPr>
+            </a:pPr>
+            <a:endParaRPr lang="es-ES"/>
+          </a:p>
+        </c:txPr>
+        <c:crossAx val="299494664"/>
+        <c:crosses val="autoZero"/>
+        <c:auto val="1"/>
+        <c:lblAlgn val="ctr"/>
+        <c:lblOffset val="100"/>
+        <c:noMultiLvlLbl val="0"/>
+      </c:catAx>
+      <c:valAx>
+        <c:axId val="299494664"/>
+        <c:scaling>
+          <c:orientation val="minMax"/>
+        </c:scaling>
+        <c:delete val="0"/>
+        <c:axPos val="l"/>
+        <c:majorGridlines>
+          <c:spPr>
+            <a:ln w="9525" cap="flat" cmpd="sng" algn="ctr">
+              <a:solidFill>
+                <a:schemeClr val="tx1">
+                  <a:lumMod val="15000"/>
+                  <a:lumOff val="85000"/>
+                </a:schemeClr>
+              </a:solidFill>
+              <a:round/>
+            </a:ln>
+            <a:effectLst/>
+          </c:spPr>
+        </c:majorGridlines>
+        <c:numFmt formatCode="General" sourceLinked="1"/>
+        <c:majorTickMark val="none"/>
+        <c:minorTickMark val="none"/>
+        <c:tickLblPos val="nextTo"/>
+        <c:spPr>
+          <a:noFill/>
+          <a:ln>
+            <a:noFill/>
+          </a:ln>
+          <a:effectLst/>
+        </c:spPr>
+        <c:txPr>
+          <a:bodyPr rot="-60000000" spcFirstLastPara="1" vertOverflow="ellipsis" vert="horz" wrap="square" anchor="ctr" anchorCtr="1"/>
+          <a:lstStyle/>
+          <a:p>
+            <a:pPr>
+              <a:defRPr sz="900" b="0" i="0" u="none" strike="noStrike" kern="1200" baseline="0">
+                <a:solidFill>
+                  <a:schemeClr val="tx1">
+                    <a:lumMod val="65000"/>
+                    <a:lumOff val="35000"/>
+                  </a:schemeClr>
+                </a:solidFill>
+                <a:latin typeface="+mn-lt"/>
+                <a:ea typeface="+mn-ea"/>
+                <a:cs typeface="+mn-cs"/>
+              </a:defRPr>
+            </a:pPr>
+            <a:endParaRPr lang="es-ES"/>
+          </a:p>
+        </c:txPr>
+        <c:crossAx val="299487216"/>
+        <c:crosses val="autoZero"/>
+        <c:crossBetween val="between"/>
+      </c:valAx>
+      <c:spPr>
+        <a:noFill/>
+        <a:ln>
+          <a:noFill/>
+        </a:ln>
+        <a:effectLst/>
+      </c:spPr>
+    </c:plotArea>
+    <c:legend>
+      <c:legendPos val="b"/>
+      <c:layout/>
+      <c:overlay val="0"/>
+      <c:spPr>
+        <a:noFill/>
+        <a:ln>
+          <a:noFill/>
+        </a:ln>
+        <a:effectLst/>
+      </c:spPr>
+      <c:txPr>
+        <a:bodyPr rot="0" spcFirstLastPara="1" vertOverflow="ellipsis" vert="horz" wrap="square" anchor="ctr" anchorCtr="1"/>
+        <a:lstStyle/>
+        <a:p>
+          <a:pPr>
+            <a:defRPr sz="1200" b="0" i="0" u="none" strike="noStrike" kern="1200" baseline="0">
+              <a:solidFill>
+                <a:schemeClr val="tx1">
+                  <a:lumMod val="65000"/>
+                  <a:lumOff val="35000"/>
+                </a:schemeClr>
+              </a:solidFill>
+              <a:latin typeface="+mn-lt"/>
+              <a:ea typeface="+mn-ea"/>
+              <a:cs typeface="+mn-cs"/>
+            </a:defRPr>
+          </a:pPr>
+          <a:endParaRPr lang="es-ES"/>
+        </a:p>
+      </c:txPr>
+    </c:legend>
     <c:plotVisOnly val="1"/>
     <c:dispBlanksAs val="gap"/>
     <c:showDLblsOverMax val="0"/>
@@ -975,6 +988,500 @@
 </file>
 
 <file path=ppt/charts/style1.xml><?xml version="1.0" encoding="utf-8"?>
+<cs:chartStyle xmlns:cs="http://schemas.microsoft.com/office/drawing/2012/chartStyle" xmlns:a="http://schemas.openxmlformats.org/drawingml/2006/main" id="286">
+  <cs:axisTitle>
+    <cs:lnRef idx="0"/>
+    <cs:fillRef idx="0"/>
+    <cs:effectRef idx="0"/>
+    <cs:fontRef idx="minor">
+      <a:schemeClr val="tx1">
+        <a:lumMod val="65000"/>
+        <a:lumOff val="35000"/>
+      </a:schemeClr>
+    </cs:fontRef>
+    <cs:defRPr sz="1000" kern="1200"/>
+  </cs:axisTitle>
+  <cs:categoryAxis>
+    <cs:lnRef idx="0"/>
+    <cs:fillRef idx="0"/>
+    <cs:effectRef idx="0"/>
+    <cs:fontRef idx="minor">
+      <a:schemeClr val="tx1">
+        <a:lumMod val="65000"/>
+        <a:lumOff val="35000"/>
+      </a:schemeClr>
+    </cs:fontRef>
+    <cs:defRPr sz="900" kern="1200"/>
+  </cs:categoryAxis>
+  <cs:chartArea mods="allowNoFillOverride allowNoLineOverride">
+    <cs:lnRef idx="0"/>
+    <cs:fillRef idx="0"/>
+    <cs:effectRef idx="0"/>
+    <cs:fontRef idx="minor">
+      <a:schemeClr val="tx1"/>
+    </cs:fontRef>
+    <cs:spPr>
+      <a:solidFill>
+        <a:schemeClr val="bg1"/>
+      </a:solidFill>
+      <a:ln w="9525" cap="flat" cmpd="sng" algn="ctr">
+        <a:solidFill>
+          <a:schemeClr val="tx1">
+            <a:lumMod val="15000"/>
+            <a:lumOff val="85000"/>
+          </a:schemeClr>
+        </a:solidFill>
+        <a:round/>
+      </a:ln>
+    </cs:spPr>
+    <cs:defRPr sz="1000" kern="1200"/>
+  </cs:chartArea>
+  <cs:dataLabel>
+    <cs:lnRef idx="0"/>
+    <cs:fillRef idx="0"/>
+    <cs:effectRef idx="0"/>
+    <cs:fontRef idx="minor">
+      <a:schemeClr val="tx1">
+        <a:lumMod val="75000"/>
+        <a:lumOff val="25000"/>
+      </a:schemeClr>
+    </cs:fontRef>
+    <cs:defRPr sz="900" kern="1200"/>
+  </cs:dataLabel>
+  <cs:dataLabelCallout>
+    <cs:lnRef idx="0"/>
+    <cs:fillRef idx="0"/>
+    <cs:effectRef idx="0"/>
+    <cs:fontRef idx="minor">
+      <a:schemeClr val="dk1">
+        <a:lumMod val="65000"/>
+        <a:lumOff val="35000"/>
+      </a:schemeClr>
+    </cs:fontRef>
+    <cs:spPr>
+      <a:solidFill>
+        <a:schemeClr val="lt1"/>
+      </a:solidFill>
+      <a:ln>
+        <a:solidFill>
+          <a:schemeClr val="dk1">
+            <a:lumMod val="25000"/>
+            <a:lumOff val="75000"/>
+          </a:schemeClr>
+        </a:solidFill>
+      </a:ln>
+    </cs:spPr>
+    <cs:defRPr sz="900" kern="1200"/>
+    <cs:bodyPr rot="0" spcFirstLastPara="1" vertOverflow="clip" horzOverflow="clip" vert="horz" wrap="square" lIns="36576" tIns="18288" rIns="36576" bIns="18288" anchor="ctr" anchorCtr="1">
+      <a:spAutoFit/>
+    </cs:bodyPr>
+  </cs:dataLabelCallout>
+  <cs:dataPoint>
+    <cs:lnRef idx="0"/>
+    <cs:fillRef idx="1">
+      <cs:styleClr val="auto"/>
+    </cs:fillRef>
+    <cs:effectRef idx="0"/>
+    <cs:fontRef idx="minor">
+      <a:schemeClr val="tx1"/>
+    </cs:fontRef>
+  </cs:dataPoint>
+  <cs:dataPoint3D>
+    <cs:lnRef idx="0"/>
+    <cs:fillRef idx="1">
+      <cs:styleClr val="auto"/>
+    </cs:fillRef>
+    <cs:effectRef idx="0"/>
+    <cs:fontRef idx="minor">
+      <a:schemeClr val="tx1"/>
+    </cs:fontRef>
+  </cs:dataPoint3D>
+  <cs:dataPointLine>
+    <cs:lnRef idx="0">
+      <cs:styleClr val="auto"/>
+    </cs:lnRef>
+    <cs:fillRef idx="1"/>
+    <cs:effectRef idx="0"/>
+    <cs:fontRef idx="minor">
+      <a:schemeClr val="tx1"/>
+    </cs:fontRef>
+    <cs:spPr>
+      <a:ln w="28575" cap="rnd">
+        <a:solidFill>
+          <a:schemeClr val="phClr"/>
+        </a:solidFill>
+        <a:round/>
+      </a:ln>
+    </cs:spPr>
+  </cs:dataPointLine>
+  <cs:dataPointMarker>
+    <cs:lnRef idx="0">
+      <cs:styleClr val="auto"/>
+    </cs:lnRef>
+    <cs:fillRef idx="1">
+      <cs:styleClr val="auto"/>
+    </cs:fillRef>
+    <cs:effectRef idx="0"/>
+    <cs:fontRef idx="minor">
+      <a:schemeClr val="tx1"/>
+    </cs:fontRef>
+    <cs:spPr>
+      <a:ln w="9525">
+        <a:solidFill>
+          <a:schemeClr val="phClr"/>
+        </a:solidFill>
+      </a:ln>
+    </cs:spPr>
+  </cs:dataPointMarker>
+  <cs:dataPointMarkerLayout symbol="circle" size="5"/>
+  <cs:dataPointWireframe>
+    <cs:lnRef idx="0">
+      <cs:styleClr val="auto"/>
+    </cs:lnRef>
+    <cs:fillRef idx="1"/>
+    <cs:effectRef idx="0"/>
+    <cs:fontRef idx="minor">
+      <a:schemeClr val="tx1"/>
+    </cs:fontRef>
+    <cs:spPr>
+      <a:ln w="9525" cap="rnd">
+        <a:solidFill>
+          <a:schemeClr val="phClr"/>
+        </a:solidFill>
+        <a:round/>
+      </a:ln>
+    </cs:spPr>
+  </cs:dataPointWireframe>
+  <cs:dataTable>
+    <cs:lnRef idx="0"/>
+    <cs:fillRef idx="0"/>
+    <cs:effectRef idx="0"/>
+    <cs:fontRef idx="minor">
+      <a:schemeClr val="tx1">
+        <a:lumMod val="65000"/>
+        <a:lumOff val="35000"/>
+      </a:schemeClr>
+    </cs:fontRef>
+    <cs:spPr>
+      <a:noFill/>
+      <a:ln w="9525" cap="flat" cmpd="sng" algn="ctr">
+        <a:solidFill>
+          <a:schemeClr val="tx1">
+            <a:lumMod val="15000"/>
+            <a:lumOff val="85000"/>
+          </a:schemeClr>
+        </a:solidFill>
+        <a:round/>
+      </a:ln>
+    </cs:spPr>
+    <cs:defRPr sz="900" kern="1200"/>
+  </cs:dataTable>
+  <cs:downBar>
+    <cs:lnRef idx="0"/>
+    <cs:fillRef idx="0"/>
+    <cs:effectRef idx="0"/>
+    <cs:fontRef idx="minor">
+      <a:schemeClr val="tx1"/>
+    </cs:fontRef>
+    <cs:spPr>
+      <a:solidFill>
+        <a:schemeClr val="dk1">
+          <a:lumMod val="75000"/>
+          <a:lumOff val="25000"/>
+        </a:schemeClr>
+      </a:solidFill>
+      <a:ln w="9525" cap="flat" cmpd="sng" algn="ctr">
+        <a:solidFill>
+          <a:schemeClr val="tx1">
+            <a:lumMod val="65000"/>
+            <a:lumOff val="35000"/>
+          </a:schemeClr>
+        </a:solidFill>
+        <a:round/>
+      </a:ln>
+    </cs:spPr>
+  </cs:downBar>
+  <cs:dropLine>
+    <cs:lnRef idx="0"/>
+    <cs:fillRef idx="0"/>
+    <cs:effectRef idx="0"/>
+    <cs:fontRef idx="minor">
+      <a:schemeClr val="tx1"/>
+    </cs:fontRef>
+    <cs:spPr>
+      <a:ln w="9525" cap="flat" cmpd="sng" algn="ctr">
+        <a:solidFill>
+          <a:schemeClr val="tx1">
+            <a:lumMod val="35000"/>
+            <a:lumOff val="65000"/>
+          </a:schemeClr>
+        </a:solidFill>
+        <a:round/>
+      </a:ln>
+    </cs:spPr>
+  </cs:dropLine>
+  <cs:errorBar>
+    <cs:lnRef idx="0"/>
+    <cs:fillRef idx="0"/>
+    <cs:effectRef idx="0"/>
+    <cs:fontRef idx="minor">
+      <a:schemeClr val="tx1"/>
+    </cs:fontRef>
+    <cs:spPr>
+      <a:ln w="9525" cap="flat" cmpd="sng" algn="ctr">
+        <a:solidFill>
+          <a:schemeClr val="tx1">
+            <a:lumMod val="65000"/>
+            <a:lumOff val="35000"/>
+          </a:schemeClr>
+        </a:solidFill>
+        <a:round/>
+      </a:ln>
+    </cs:spPr>
+  </cs:errorBar>
+  <cs:floor>
+    <cs:lnRef idx="0"/>
+    <cs:fillRef idx="0"/>
+    <cs:effectRef idx="0"/>
+    <cs:fontRef idx="minor">
+      <a:schemeClr val="tx1"/>
+    </cs:fontRef>
+    <cs:spPr>
+      <a:noFill/>
+      <a:ln>
+        <a:noFill/>
+      </a:ln>
+    </cs:spPr>
+  </cs:floor>
+  <cs:gridlineMajor>
+    <cs:lnRef idx="0"/>
+    <cs:fillRef idx="0"/>
+    <cs:effectRef idx="0"/>
+    <cs:fontRef idx="minor">
+      <a:schemeClr val="tx1"/>
+    </cs:fontRef>
+    <cs:spPr>
+      <a:ln w="9525" cap="flat" cmpd="sng" algn="ctr">
+        <a:solidFill>
+          <a:schemeClr val="tx1">
+            <a:lumMod val="15000"/>
+            <a:lumOff val="85000"/>
+          </a:schemeClr>
+        </a:solidFill>
+        <a:round/>
+      </a:ln>
+    </cs:spPr>
+  </cs:gridlineMajor>
+  <cs:gridlineMinor>
+    <cs:lnRef idx="0"/>
+    <cs:fillRef idx="0"/>
+    <cs:effectRef idx="0"/>
+    <cs:fontRef idx="minor">
+      <a:schemeClr val="tx1"/>
+    </cs:fontRef>
+    <cs:spPr>
+      <a:ln w="9525" cap="flat" cmpd="sng" algn="ctr">
+        <a:solidFill>
+          <a:schemeClr val="tx1">
+            <a:lumMod val="5000"/>
+            <a:lumOff val="95000"/>
+          </a:schemeClr>
+        </a:solidFill>
+        <a:round/>
+      </a:ln>
+    </cs:spPr>
+  </cs:gridlineMinor>
+  <cs:hiLoLine>
+    <cs:lnRef idx="0"/>
+    <cs:fillRef idx="0"/>
+    <cs:effectRef idx="0"/>
+    <cs:fontRef idx="minor">
+      <a:schemeClr val="tx1"/>
+    </cs:fontRef>
+    <cs:spPr>
+      <a:ln w="9525" cap="flat" cmpd="sng" algn="ctr">
+        <a:solidFill>
+          <a:schemeClr val="tx1">
+            <a:lumMod val="50000"/>
+            <a:lumOff val="50000"/>
+          </a:schemeClr>
+        </a:solidFill>
+        <a:round/>
+      </a:ln>
+    </cs:spPr>
+  </cs:hiLoLine>
+  <cs:leaderLine>
+    <cs:lnRef idx="0"/>
+    <cs:fillRef idx="0"/>
+    <cs:effectRef idx="0"/>
+    <cs:fontRef idx="minor">
+      <a:schemeClr val="tx1"/>
+    </cs:fontRef>
+    <cs:spPr>
+      <a:ln w="9525" cap="flat" cmpd="sng" algn="ctr">
+        <a:solidFill>
+          <a:schemeClr val="tx1">
+            <a:lumMod val="35000"/>
+            <a:lumOff val="65000"/>
+          </a:schemeClr>
+        </a:solidFill>
+        <a:round/>
+      </a:ln>
+    </cs:spPr>
+  </cs:leaderLine>
+  <cs:legend>
+    <cs:lnRef idx="0"/>
+    <cs:fillRef idx="0"/>
+    <cs:effectRef idx="0"/>
+    <cs:fontRef idx="minor">
+      <a:schemeClr val="tx1">
+        <a:lumMod val="65000"/>
+        <a:lumOff val="35000"/>
+      </a:schemeClr>
+    </cs:fontRef>
+    <cs:defRPr sz="900" kern="1200"/>
+  </cs:legend>
+  <cs:plotArea mods="allowNoFillOverride allowNoLineOverride">
+    <cs:lnRef idx="0"/>
+    <cs:fillRef idx="0"/>
+    <cs:effectRef idx="0"/>
+    <cs:fontRef idx="minor">
+      <a:schemeClr val="tx1"/>
+    </cs:fontRef>
+  </cs:plotArea>
+  <cs:plotArea3D mods="allowNoFillOverride allowNoLineOverride">
+    <cs:lnRef idx="0"/>
+    <cs:fillRef idx="0"/>
+    <cs:effectRef idx="0"/>
+    <cs:fontRef idx="minor">
+      <a:schemeClr val="tx1"/>
+    </cs:fontRef>
+  </cs:plotArea3D>
+  <cs:seriesAxis>
+    <cs:lnRef idx="0"/>
+    <cs:fillRef idx="0"/>
+    <cs:effectRef idx="0"/>
+    <cs:fontRef idx="minor">
+      <a:schemeClr val="tx1">
+        <a:lumMod val="65000"/>
+        <a:lumOff val="35000"/>
+      </a:schemeClr>
+    </cs:fontRef>
+    <cs:defRPr sz="900" kern="1200"/>
+  </cs:seriesAxis>
+  <cs:seriesLine>
+    <cs:lnRef idx="0"/>
+    <cs:fillRef idx="0"/>
+    <cs:effectRef idx="0"/>
+    <cs:fontRef idx="minor">
+      <a:schemeClr val="tx1"/>
+    </cs:fontRef>
+    <cs:spPr>
+      <a:ln w="9525" cap="flat" cmpd="sng" algn="ctr">
+        <a:solidFill>
+          <a:schemeClr val="tx1">
+            <a:lumMod val="35000"/>
+            <a:lumOff val="65000"/>
+          </a:schemeClr>
+        </a:solidFill>
+        <a:round/>
+      </a:ln>
+    </cs:spPr>
+  </cs:seriesLine>
+  <cs:title>
+    <cs:lnRef idx="0"/>
+    <cs:fillRef idx="0"/>
+    <cs:effectRef idx="0"/>
+    <cs:fontRef idx="minor">
+      <a:schemeClr val="tx1">
+        <a:lumMod val="65000"/>
+        <a:lumOff val="35000"/>
+      </a:schemeClr>
+    </cs:fontRef>
+    <cs:defRPr sz="1400" b="0" kern="1200" spc="0" baseline="0"/>
+  </cs:title>
+  <cs:trendline>
+    <cs:lnRef idx="0">
+      <cs:styleClr val="auto"/>
+    </cs:lnRef>
+    <cs:fillRef idx="0"/>
+    <cs:effectRef idx="0"/>
+    <cs:fontRef idx="minor">
+      <a:schemeClr val="tx1"/>
+    </cs:fontRef>
+    <cs:spPr>
+      <a:ln w="19050" cap="rnd">
+        <a:solidFill>
+          <a:schemeClr val="phClr"/>
+        </a:solidFill>
+        <a:prstDash val="sysDot"/>
+      </a:ln>
+    </cs:spPr>
+  </cs:trendline>
+  <cs:trendlineLabel>
+    <cs:lnRef idx="0"/>
+    <cs:fillRef idx="0"/>
+    <cs:effectRef idx="0"/>
+    <cs:fontRef idx="minor">
+      <a:schemeClr val="tx1">
+        <a:lumMod val="65000"/>
+        <a:lumOff val="35000"/>
+      </a:schemeClr>
+    </cs:fontRef>
+    <cs:defRPr sz="900" kern="1200"/>
+  </cs:trendlineLabel>
+  <cs:upBar>
+    <cs:lnRef idx="0"/>
+    <cs:fillRef idx="0"/>
+    <cs:effectRef idx="0"/>
+    <cs:fontRef idx="minor">
+      <a:schemeClr val="tx1"/>
+    </cs:fontRef>
+    <cs:spPr>
+      <a:solidFill>
+        <a:schemeClr val="lt1"/>
+      </a:solidFill>
+      <a:ln w="9525" cap="flat" cmpd="sng" algn="ctr">
+        <a:solidFill>
+          <a:schemeClr val="tx1">
+            <a:lumMod val="65000"/>
+            <a:lumOff val="35000"/>
+          </a:schemeClr>
+        </a:solidFill>
+        <a:round/>
+      </a:ln>
+    </cs:spPr>
+  </cs:upBar>
+  <cs:valueAxis>
+    <cs:lnRef idx="0"/>
+    <cs:fillRef idx="0"/>
+    <cs:effectRef idx="0"/>
+    <cs:fontRef idx="minor">
+      <a:schemeClr val="tx1">
+        <a:lumMod val="65000"/>
+        <a:lumOff val="35000"/>
+      </a:schemeClr>
+    </cs:fontRef>
+    <cs:defRPr sz="900" kern="1200"/>
+  </cs:valueAxis>
+  <cs:wall>
+    <cs:lnRef idx="0"/>
+    <cs:fillRef idx="0"/>
+    <cs:effectRef idx="0"/>
+    <cs:fontRef idx="minor">
+      <a:schemeClr val="tx1"/>
+    </cs:fontRef>
+    <cs:spPr>
+      <a:noFill/>
+      <a:ln>
+        <a:noFill/>
+      </a:ln>
+    </cs:spPr>
+  </cs:wall>
+</cs:chartStyle>
+</file>
+
+<file path=ppt/charts/style2.xml><?xml version="1.0" encoding="utf-8"?>
 <cs:chartStyle xmlns:cs="http://schemas.microsoft.com/office/drawing/2012/chartStyle" xmlns:a="http://schemas.openxmlformats.org/drawingml/2006/main" id="201">
   <cs:axisTitle>
     <cs:lnRef idx="0"/>
@@ -1477,500 +1984,6 @@
 </cs:chartStyle>
 </file>
 
-<file path=ppt/charts/style2.xml><?xml version="1.0" encoding="utf-8"?>
-<cs:chartStyle xmlns:cs="http://schemas.microsoft.com/office/drawing/2012/chartStyle" xmlns:a="http://schemas.openxmlformats.org/drawingml/2006/main" id="286">
-  <cs:axisTitle>
-    <cs:lnRef idx="0"/>
-    <cs:fillRef idx="0"/>
-    <cs:effectRef idx="0"/>
-    <cs:fontRef idx="minor">
-      <a:schemeClr val="tx1">
-        <a:lumMod val="65000"/>
-        <a:lumOff val="35000"/>
-      </a:schemeClr>
-    </cs:fontRef>
-    <cs:defRPr sz="1000" kern="1200"/>
-  </cs:axisTitle>
-  <cs:categoryAxis>
-    <cs:lnRef idx="0"/>
-    <cs:fillRef idx="0"/>
-    <cs:effectRef idx="0"/>
-    <cs:fontRef idx="minor">
-      <a:schemeClr val="tx1">
-        <a:lumMod val="65000"/>
-        <a:lumOff val="35000"/>
-      </a:schemeClr>
-    </cs:fontRef>
-    <cs:defRPr sz="900" kern="1200"/>
-  </cs:categoryAxis>
-  <cs:chartArea mods="allowNoFillOverride allowNoLineOverride">
-    <cs:lnRef idx="0"/>
-    <cs:fillRef idx="0"/>
-    <cs:effectRef idx="0"/>
-    <cs:fontRef idx="minor">
-      <a:schemeClr val="tx1"/>
-    </cs:fontRef>
-    <cs:spPr>
-      <a:solidFill>
-        <a:schemeClr val="bg1"/>
-      </a:solidFill>
-      <a:ln w="9525" cap="flat" cmpd="sng" algn="ctr">
-        <a:solidFill>
-          <a:schemeClr val="tx1">
-            <a:lumMod val="15000"/>
-            <a:lumOff val="85000"/>
-          </a:schemeClr>
-        </a:solidFill>
-        <a:round/>
-      </a:ln>
-    </cs:spPr>
-    <cs:defRPr sz="1000" kern="1200"/>
-  </cs:chartArea>
-  <cs:dataLabel>
-    <cs:lnRef idx="0"/>
-    <cs:fillRef idx="0"/>
-    <cs:effectRef idx="0"/>
-    <cs:fontRef idx="minor">
-      <a:schemeClr val="tx1">
-        <a:lumMod val="75000"/>
-        <a:lumOff val="25000"/>
-      </a:schemeClr>
-    </cs:fontRef>
-    <cs:defRPr sz="900" kern="1200"/>
-  </cs:dataLabel>
-  <cs:dataLabelCallout>
-    <cs:lnRef idx="0"/>
-    <cs:fillRef idx="0"/>
-    <cs:effectRef idx="0"/>
-    <cs:fontRef idx="minor">
-      <a:schemeClr val="dk1">
-        <a:lumMod val="65000"/>
-        <a:lumOff val="35000"/>
-      </a:schemeClr>
-    </cs:fontRef>
-    <cs:spPr>
-      <a:solidFill>
-        <a:schemeClr val="lt1"/>
-      </a:solidFill>
-      <a:ln>
-        <a:solidFill>
-          <a:schemeClr val="dk1">
-            <a:lumMod val="25000"/>
-            <a:lumOff val="75000"/>
-          </a:schemeClr>
-        </a:solidFill>
-      </a:ln>
-    </cs:spPr>
-    <cs:defRPr sz="900" kern="1200"/>
-    <cs:bodyPr rot="0" spcFirstLastPara="1" vertOverflow="clip" horzOverflow="clip" vert="horz" wrap="square" lIns="36576" tIns="18288" rIns="36576" bIns="18288" anchor="ctr" anchorCtr="1">
-      <a:spAutoFit/>
-    </cs:bodyPr>
-  </cs:dataLabelCallout>
-  <cs:dataPoint>
-    <cs:lnRef idx="0"/>
-    <cs:fillRef idx="1">
-      <cs:styleClr val="auto"/>
-    </cs:fillRef>
-    <cs:effectRef idx="0"/>
-    <cs:fontRef idx="minor">
-      <a:schemeClr val="tx1"/>
-    </cs:fontRef>
-  </cs:dataPoint>
-  <cs:dataPoint3D>
-    <cs:lnRef idx="0"/>
-    <cs:fillRef idx="1">
-      <cs:styleClr val="auto"/>
-    </cs:fillRef>
-    <cs:effectRef idx="0"/>
-    <cs:fontRef idx="minor">
-      <a:schemeClr val="tx1"/>
-    </cs:fontRef>
-  </cs:dataPoint3D>
-  <cs:dataPointLine>
-    <cs:lnRef idx="0">
-      <cs:styleClr val="auto"/>
-    </cs:lnRef>
-    <cs:fillRef idx="1"/>
-    <cs:effectRef idx="0"/>
-    <cs:fontRef idx="minor">
-      <a:schemeClr val="tx1"/>
-    </cs:fontRef>
-    <cs:spPr>
-      <a:ln w="28575" cap="rnd">
-        <a:solidFill>
-          <a:schemeClr val="phClr"/>
-        </a:solidFill>
-        <a:round/>
-      </a:ln>
-    </cs:spPr>
-  </cs:dataPointLine>
-  <cs:dataPointMarker>
-    <cs:lnRef idx="0">
-      <cs:styleClr val="auto"/>
-    </cs:lnRef>
-    <cs:fillRef idx="1">
-      <cs:styleClr val="auto"/>
-    </cs:fillRef>
-    <cs:effectRef idx="0"/>
-    <cs:fontRef idx="minor">
-      <a:schemeClr val="tx1"/>
-    </cs:fontRef>
-    <cs:spPr>
-      <a:ln w="9525">
-        <a:solidFill>
-          <a:schemeClr val="phClr"/>
-        </a:solidFill>
-      </a:ln>
-    </cs:spPr>
-  </cs:dataPointMarker>
-  <cs:dataPointMarkerLayout symbol="circle" size="5"/>
-  <cs:dataPointWireframe>
-    <cs:lnRef idx="0">
-      <cs:styleClr val="auto"/>
-    </cs:lnRef>
-    <cs:fillRef idx="1"/>
-    <cs:effectRef idx="0"/>
-    <cs:fontRef idx="minor">
-      <a:schemeClr val="tx1"/>
-    </cs:fontRef>
-    <cs:spPr>
-      <a:ln w="9525" cap="rnd">
-        <a:solidFill>
-          <a:schemeClr val="phClr"/>
-        </a:solidFill>
-        <a:round/>
-      </a:ln>
-    </cs:spPr>
-  </cs:dataPointWireframe>
-  <cs:dataTable>
-    <cs:lnRef idx="0"/>
-    <cs:fillRef idx="0"/>
-    <cs:effectRef idx="0"/>
-    <cs:fontRef idx="minor">
-      <a:schemeClr val="tx1">
-        <a:lumMod val="65000"/>
-        <a:lumOff val="35000"/>
-      </a:schemeClr>
-    </cs:fontRef>
-    <cs:spPr>
-      <a:noFill/>
-      <a:ln w="9525" cap="flat" cmpd="sng" algn="ctr">
-        <a:solidFill>
-          <a:schemeClr val="tx1">
-            <a:lumMod val="15000"/>
-            <a:lumOff val="85000"/>
-          </a:schemeClr>
-        </a:solidFill>
-        <a:round/>
-      </a:ln>
-    </cs:spPr>
-    <cs:defRPr sz="900" kern="1200"/>
-  </cs:dataTable>
-  <cs:downBar>
-    <cs:lnRef idx="0"/>
-    <cs:fillRef idx="0"/>
-    <cs:effectRef idx="0"/>
-    <cs:fontRef idx="minor">
-      <a:schemeClr val="tx1"/>
-    </cs:fontRef>
-    <cs:spPr>
-      <a:solidFill>
-        <a:schemeClr val="dk1">
-          <a:lumMod val="75000"/>
-          <a:lumOff val="25000"/>
-        </a:schemeClr>
-      </a:solidFill>
-      <a:ln w="9525" cap="flat" cmpd="sng" algn="ctr">
-        <a:solidFill>
-          <a:schemeClr val="tx1">
-            <a:lumMod val="65000"/>
-            <a:lumOff val="35000"/>
-          </a:schemeClr>
-        </a:solidFill>
-        <a:round/>
-      </a:ln>
-    </cs:spPr>
-  </cs:downBar>
-  <cs:dropLine>
-    <cs:lnRef idx="0"/>
-    <cs:fillRef idx="0"/>
-    <cs:effectRef idx="0"/>
-    <cs:fontRef idx="minor">
-      <a:schemeClr val="tx1"/>
-    </cs:fontRef>
-    <cs:spPr>
-      <a:ln w="9525" cap="flat" cmpd="sng" algn="ctr">
-        <a:solidFill>
-          <a:schemeClr val="tx1">
-            <a:lumMod val="35000"/>
-            <a:lumOff val="65000"/>
-          </a:schemeClr>
-        </a:solidFill>
-        <a:round/>
-      </a:ln>
-    </cs:spPr>
-  </cs:dropLine>
-  <cs:errorBar>
-    <cs:lnRef idx="0"/>
-    <cs:fillRef idx="0"/>
-    <cs:effectRef idx="0"/>
-    <cs:fontRef idx="minor">
-      <a:schemeClr val="tx1"/>
-    </cs:fontRef>
-    <cs:spPr>
-      <a:ln w="9525" cap="flat" cmpd="sng" algn="ctr">
-        <a:solidFill>
-          <a:schemeClr val="tx1">
-            <a:lumMod val="65000"/>
-            <a:lumOff val="35000"/>
-          </a:schemeClr>
-        </a:solidFill>
-        <a:round/>
-      </a:ln>
-    </cs:spPr>
-  </cs:errorBar>
-  <cs:floor>
-    <cs:lnRef idx="0"/>
-    <cs:fillRef idx="0"/>
-    <cs:effectRef idx="0"/>
-    <cs:fontRef idx="minor">
-      <a:schemeClr val="tx1"/>
-    </cs:fontRef>
-    <cs:spPr>
-      <a:noFill/>
-      <a:ln>
-        <a:noFill/>
-      </a:ln>
-    </cs:spPr>
-  </cs:floor>
-  <cs:gridlineMajor>
-    <cs:lnRef idx="0"/>
-    <cs:fillRef idx="0"/>
-    <cs:effectRef idx="0"/>
-    <cs:fontRef idx="minor">
-      <a:schemeClr val="tx1"/>
-    </cs:fontRef>
-    <cs:spPr>
-      <a:ln w="9525" cap="flat" cmpd="sng" algn="ctr">
-        <a:solidFill>
-          <a:schemeClr val="tx1">
-            <a:lumMod val="15000"/>
-            <a:lumOff val="85000"/>
-          </a:schemeClr>
-        </a:solidFill>
-        <a:round/>
-      </a:ln>
-    </cs:spPr>
-  </cs:gridlineMajor>
-  <cs:gridlineMinor>
-    <cs:lnRef idx="0"/>
-    <cs:fillRef idx="0"/>
-    <cs:effectRef idx="0"/>
-    <cs:fontRef idx="minor">
-      <a:schemeClr val="tx1"/>
-    </cs:fontRef>
-    <cs:spPr>
-      <a:ln w="9525" cap="flat" cmpd="sng" algn="ctr">
-        <a:solidFill>
-          <a:schemeClr val="tx1">
-            <a:lumMod val="5000"/>
-            <a:lumOff val="95000"/>
-          </a:schemeClr>
-        </a:solidFill>
-        <a:round/>
-      </a:ln>
-    </cs:spPr>
-  </cs:gridlineMinor>
-  <cs:hiLoLine>
-    <cs:lnRef idx="0"/>
-    <cs:fillRef idx="0"/>
-    <cs:effectRef idx="0"/>
-    <cs:fontRef idx="minor">
-      <a:schemeClr val="tx1"/>
-    </cs:fontRef>
-    <cs:spPr>
-      <a:ln w="9525" cap="flat" cmpd="sng" algn="ctr">
-        <a:solidFill>
-          <a:schemeClr val="tx1">
-            <a:lumMod val="50000"/>
-            <a:lumOff val="50000"/>
-          </a:schemeClr>
-        </a:solidFill>
-        <a:round/>
-      </a:ln>
-    </cs:spPr>
-  </cs:hiLoLine>
-  <cs:leaderLine>
-    <cs:lnRef idx="0"/>
-    <cs:fillRef idx="0"/>
-    <cs:effectRef idx="0"/>
-    <cs:fontRef idx="minor">
-      <a:schemeClr val="tx1"/>
-    </cs:fontRef>
-    <cs:spPr>
-      <a:ln w="9525" cap="flat" cmpd="sng" algn="ctr">
-        <a:solidFill>
-          <a:schemeClr val="tx1">
-            <a:lumMod val="35000"/>
-            <a:lumOff val="65000"/>
-          </a:schemeClr>
-        </a:solidFill>
-        <a:round/>
-      </a:ln>
-    </cs:spPr>
-  </cs:leaderLine>
-  <cs:legend>
-    <cs:lnRef idx="0"/>
-    <cs:fillRef idx="0"/>
-    <cs:effectRef idx="0"/>
-    <cs:fontRef idx="minor">
-      <a:schemeClr val="tx1">
-        <a:lumMod val="65000"/>
-        <a:lumOff val="35000"/>
-      </a:schemeClr>
-    </cs:fontRef>
-    <cs:defRPr sz="900" kern="1200"/>
-  </cs:legend>
-  <cs:plotArea mods="allowNoFillOverride allowNoLineOverride">
-    <cs:lnRef idx="0"/>
-    <cs:fillRef idx="0"/>
-    <cs:effectRef idx="0"/>
-    <cs:fontRef idx="minor">
-      <a:schemeClr val="tx1"/>
-    </cs:fontRef>
-  </cs:plotArea>
-  <cs:plotArea3D mods="allowNoFillOverride allowNoLineOverride">
-    <cs:lnRef idx="0"/>
-    <cs:fillRef idx="0"/>
-    <cs:effectRef idx="0"/>
-    <cs:fontRef idx="minor">
-      <a:schemeClr val="tx1"/>
-    </cs:fontRef>
-  </cs:plotArea3D>
-  <cs:seriesAxis>
-    <cs:lnRef idx="0"/>
-    <cs:fillRef idx="0"/>
-    <cs:effectRef idx="0"/>
-    <cs:fontRef idx="minor">
-      <a:schemeClr val="tx1">
-        <a:lumMod val="65000"/>
-        <a:lumOff val="35000"/>
-      </a:schemeClr>
-    </cs:fontRef>
-    <cs:defRPr sz="900" kern="1200"/>
-  </cs:seriesAxis>
-  <cs:seriesLine>
-    <cs:lnRef idx="0"/>
-    <cs:fillRef idx="0"/>
-    <cs:effectRef idx="0"/>
-    <cs:fontRef idx="minor">
-      <a:schemeClr val="tx1"/>
-    </cs:fontRef>
-    <cs:spPr>
-      <a:ln w="9525" cap="flat" cmpd="sng" algn="ctr">
-        <a:solidFill>
-          <a:schemeClr val="tx1">
-            <a:lumMod val="35000"/>
-            <a:lumOff val="65000"/>
-          </a:schemeClr>
-        </a:solidFill>
-        <a:round/>
-      </a:ln>
-    </cs:spPr>
-  </cs:seriesLine>
-  <cs:title>
-    <cs:lnRef idx="0"/>
-    <cs:fillRef idx="0"/>
-    <cs:effectRef idx="0"/>
-    <cs:fontRef idx="minor">
-      <a:schemeClr val="tx1">
-        <a:lumMod val="65000"/>
-        <a:lumOff val="35000"/>
-      </a:schemeClr>
-    </cs:fontRef>
-    <cs:defRPr sz="1400" b="0" kern="1200" spc="0" baseline="0"/>
-  </cs:title>
-  <cs:trendline>
-    <cs:lnRef idx="0">
-      <cs:styleClr val="auto"/>
-    </cs:lnRef>
-    <cs:fillRef idx="0"/>
-    <cs:effectRef idx="0"/>
-    <cs:fontRef idx="minor">
-      <a:schemeClr val="tx1"/>
-    </cs:fontRef>
-    <cs:spPr>
-      <a:ln w="19050" cap="rnd">
-        <a:solidFill>
-          <a:schemeClr val="phClr"/>
-        </a:solidFill>
-        <a:prstDash val="sysDot"/>
-      </a:ln>
-    </cs:spPr>
-  </cs:trendline>
-  <cs:trendlineLabel>
-    <cs:lnRef idx="0"/>
-    <cs:fillRef idx="0"/>
-    <cs:effectRef idx="0"/>
-    <cs:fontRef idx="minor">
-      <a:schemeClr val="tx1">
-        <a:lumMod val="65000"/>
-        <a:lumOff val="35000"/>
-      </a:schemeClr>
-    </cs:fontRef>
-    <cs:defRPr sz="900" kern="1200"/>
-  </cs:trendlineLabel>
-  <cs:upBar>
-    <cs:lnRef idx="0"/>
-    <cs:fillRef idx="0"/>
-    <cs:effectRef idx="0"/>
-    <cs:fontRef idx="minor">
-      <a:schemeClr val="tx1"/>
-    </cs:fontRef>
-    <cs:spPr>
-      <a:solidFill>
-        <a:schemeClr val="lt1"/>
-      </a:solidFill>
-      <a:ln w="9525" cap="flat" cmpd="sng" algn="ctr">
-        <a:solidFill>
-          <a:schemeClr val="tx1">
-            <a:lumMod val="65000"/>
-            <a:lumOff val="35000"/>
-          </a:schemeClr>
-        </a:solidFill>
-        <a:round/>
-      </a:ln>
-    </cs:spPr>
-  </cs:upBar>
-  <cs:valueAxis>
-    <cs:lnRef idx="0"/>
-    <cs:fillRef idx="0"/>
-    <cs:effectRef idx="0"/>
-    <cs:fontRef idx="minor">
-      <a:schemeClr val="tx1">
-        <a:lumMod val="65000"/>
-        <a:lumOff val="35000"/>
-      </a:schemeClr>
-    </cs:fontRef>
-    <cs:defRPr sz="900" kern="1200"/>
-  </cs:valueAxis>
-  <cs:wall>
-    <cs:lnRef idx="0"/>
-    <cs:fillRef idx="0"/>
-    <cs:effectRef idx="0"/>
-    <cs:fontRef idx="minor">
-      <a:schemeClr val="tx1"/>
-    </cs:fontRef>
-    <cs:spPr>
-      <a:noFill/>
-      <a:ln>
-        <a:noFill/>
-      </a:ln>
-    </cs:spPr>
-  </cs:wall>
-</cs:chartStyle>
-</file>
-
 <file path=ppt/notesMasters/notesMaster1.xml><?xml version="1.0" encoding="utf-8"?>
 <p:notesMaster xmlns:a="http://schemas.openxmlformats.org/drawingml/2006/main" xmlns:r="http://schemas.openxmlformats.org/officeDocument/2006/relationships" xmlns:p="http://schemas.openxmlformats.org/presentationml/2006/main">
   <p:cSld>
@@ -2212,7 +2225,7 @@
           <a:p>
             <a:fld id="{65154C0B-E2C7-4D9E-827C-72C00C2A711B}" type="slidenum">
               <a:rPr lang="es-ES" smtClean="0"/>
-              <a:t>‹Nº›</a:t>
+              <a:t>‹#›</a:t>
             </a:fld>
             <a:endParaRPr lang="es-ES"/>
           </a:p>
@@ -2839,7 +2852,7 @@
           <a:p>
             <a:fld id="{D0D03522-ACFB-465D-BFFC-5FB31DCDE28F}" type="slidenum">
               <a:rPr lang="es-ES" smtClean="0"/>
-              <a:t>‹Nº›</a:t>
+              <a:t>‹#›</a:t>
             </a:fld>
             <a:endParaRPr lang="es-ES"/>
           </a:p>
@@ -3047,7 +3060,7 @@
           <a:p>
             <a:fld id="{D0D03522-ACFB-465D-BFFC-5FB31DCDE28F}" type="slidenum">
               <a:rPr lang="es-ES" smtClean="0"/>
-              <a:t>‹Nº›</a:t>
+              <a:t>‹#›</a:t>
             </a:fld>
             <a:endParaRPr lang="es-ES"/>
           </a:p>
@@ -3227,7 +3240,7 @@
           <a:p>
             <a:fld id="{D0D03522-ACFB-465D-BFFC-5FB31DCDE28F}" type="slidenum">
               <a:rPr lang="es-ES" smtClean="0"/>
-              <a:t>‹Nº›</a:t>
+              <a:t>‹#›</a:t>
             </a:fld>
             <a:endParaRPr lang="es-ES"/>
           </a:p>
@@ -3397,7 +3410,7 @@
           <a:p>
             <a:fld id="{D0D03522-ACFB-465D-BFFC-5FB31DCDE28F}" type="slidenum">
               <a:rPr lang="es-ES" smtClean="0"/>
-              <a:t>‹Nº›</a:t>
+              <a:t>‹#›</a:t>
             </a:fld>
             <a:endParaRPr lang="es-ES"/>
           </a:p>
@@ -3651,7 +3664,7 @@
           <a:p>
             <a:fld id="{D0D03522-ACFB-465D-BFFC-5FB31DCDE28F}" type="slidenum">
               <a:rPr lang="es-ES" smtClean="0"/>
-              <a:t>‹Nº›</a:t>
+              <a:t>‹#›</a:t>
             </a:fld>
             <a:endParaRPr lang="es-ES"/>
           </a:p>
@@ -3977,7 +3990,7 @@
           <a:p>
             <a:fld id="{D0D03522-ACFB-465D-BFFC-5FB31DCDE28F}" type="slidenum">
               <a:rPr lang="es-ES" smtClean="0"/>
-              <a:t>‹Nº›</a:t>
+              <a:t>‹#›</a:t>
             </a:fld>
             <a:endParaRPr lang="es-ES"/>
           </a:p>
@@ -4428,7 +4441,7 @@
           <a:p>
             <a:fld id="{D0D03522-ACFB-465D-BFFC-5FB31DCDE28F}" type="slidenum">
               <a:rPr lang="es-ES" smtClean="0"/>
-              <a:t>‹Nº›</a:t>
+              <a:t>‹#›</a:t>
             </a:fld>
             <a:endParaRPr lang="es-ES"/>
           </a:p>
@@ -4546,7 +4559,7 @@
           <a:p>
             <a:fld id="{D0D03522-ACFB-465D-BFFC-5FB31DCDE28F}" type="slidenum">
               <a:rPr lang="es-ES" smtClean="0"/>
-              <a:t>‹Nº›</a:t>
+              <a:t>‹#›</a:t>
             </a:fld>
             <a:endParaRPr lang="es-ES"/>
           </a:p>
@@ -4641,7 +4654,7 @@
           <a:p>
             <a:fld id="{D0D03522-ACFB-465D-BFFC-5FB31DCDE28F}" type="slidenum">
               <a:rPr lang="es-ES" smtClean="0"/>
-              <a:t>‹Nº›</a:t>
+              <a:t>‹#›</a:t>
             </a:fld>
             <a:endParaRPr lang="es-ES"/>
           </a:p>
@@ -4928,7 +4941,7 @@
           <a:p>
             <a:fld id="{D0D03522-ACFB-465D-BFFC-5FB31DCDE28F}" type="slidenum">
               <a:rPr lang="es-ES" smtClean="0"/>
-              <a:t>‹Nº›</a:t>
+              <a:t>‹#›</a:t>
             </a:fld>
             <a:endParaRPr lang="es-ES"/>
           </a:p>
@@ -5250,7 +5263,7 @@
           <a:p>
             <a:fld id="{D0D03522-ACFB-465D-BFFC-5FB31DCDE28F}" type="slidenum">
               <a:rPr lang="es-ES" smtClean="0"/>
-              <a:t>‹Nº›</a:t>
+              <a:t>‹#›</a:t>
             </a:fld>
             <a:endParaRPr lang="es-ES"/>
           </a:p>
@@ -5544,7 +5557,7 @@
           <a:p>
             <a:fld id="{D0D03522-ACFB-465D-BFFC-5FB31DCDE28F}" type="slidenum">
               <a:rPr lang="es-ES" smtClean="0"/>
-              <a:t>‹Nº›</a:t>
+              <a:t>‹#›</a:t>
             </a:fld>
             <a:endParaRPr lang="es-ES"/>
           </a:p>
@@ -7957,7 +7970,7 @@
           <a:p>
             <a:r>
               <a:rPr lang="es-ES" dirty="0" smtClean="0"/>
-              <a:t>Análisis preliminar de resultados</a:t>
+              <a:t>Proporción del espacio de búsqueda</a:t>
             </a:r>
             <a:endParaRPr lang="es-ES" dirty="0"/>
           </a:p>
@@ -7965,21 +7978,21 @@
       </p:sp>
       <p:graphicFrame>
         <p:nvGraphicFramePr>
-          <p:cNvPr id="10" name="Gráfico 9"/>
+          <p:cNvPr id="4" name="Gráfico 3"/>
           <p:cNvGraphicFramePr>
             <a:graphicFrameLocks/>
           </p:cNvGraphicFramePr>
           <p:nvPr>
             <p:extLst>
               <p:ext uri="{D42A27DB-BD31-4B8C-83A1-F6EECF244321}">
-                <p14:modId xmlns:p14="http://schemas.microsoft.com/office/powerpoint/2010/main" val="3825528206"/>
+                <p14:modId xmlns:p14="http://schemas.microsoft.com/office/powerpoint/2010/main" val="725268739"/>
               </p:ext>
             </p:extLst>
           </p:nvPr>
         </p:nvGraphicFramePr>
         <p:xfrm>
-          <a:off x="1057014" y="1386909"/>
-          <a:ext cx="9169166" cy="5156503"/>
+          <a:off x="1098958" y="1780562"/>
+          <a:ext cx="8082571" cy="4276289"/>
         </p:xfrm>
         <a:graphic>
           <a:graphicData uri="http://schemas.openxmlformats.org/drawingml/2006/chart">
@@ -7987,10 +8000,100 @@
           </a:graphicData>
         </a:graphic>
       </p:graphicFrame>
+      <p:sp>
+        <p:nvSpPr>
+          <p:cNvPr id="3" name="TextBox 2"/>
+          <p:cNvSpPr txBox="1"/>
+          <p:nvPr/>
+        </p:nvSpPr>
+        <p:spPr>
+          <a:xfrm>
+            <a:off x="5140243" y="4656081"/>
+            <a:ext cx="819808" cy="369332"/>
+          </a:xfrm>
+          <a:prstGeom prst="rect">
+            <a:avLst/>
+          </a:prstGeom>
+          <a:noFill/>
+        </p:spPr>
+        <p:txBody>
+          <a:bodyPr wrap="square" rtlCol="0">
+            <a:spAutoFit/>
+          </a:bodyPr>
+          <a:lstStyle/>
+          <a:p>
+            <a:r>
+              <a:rPr lang="es-ES" dirty="0" smtClean="0"/>
+              <a:t>0.6%</a:t>
+            </a:r>
+            <a:endParaRPr lang="es-ES" dirty="0"/>
+          </a:p>
+        </p:txBody>
+      </p:sp>
+      <p:sp>
+        <p:nvSpPr>
+          <p:cNvPr id="5" name="TextBox 4"/>
+          <p:cNvSpPr txBox="1"/>
+          <p:nvPr/>
+        </p:nvSpPr>
+        <p:spPr>
+          <a:xfrm>
+            <a:off x="2969172" y="4941330"/>
+            <a:ext cx="819808" cy="369332"/>
+          </a:xfrm>
+          <a:prstGeom prst="rect">
+            <a:avLst/>
+          </a:prstGeom>
+          <a:noFill/>
+        </p:spPr>
+        <p:txBody>
+          <a:bodyPr wrap="square" rtlCol="0">
+            <a:spAutoFit/>
+          </a:bodyPr>
+          <a:lstStyle/>
+          <a:p>
+            <a:r>
+              <a:rPr lang="es-ES" dirty="0" smtClean="0"/>
+              <a:t>0.02%</a:t>
+            </a:r>
+            <a:endParaRPr lang="es-ES" dirty="0"/>
+          </a:p>
+        </p:txBody>
+      </p:sp>
+      <p:sp>
+        <p:nvSpPr>
+          <p:cNvPr id="6" name="TextBox 5"/>
+          <p:cNvSpPr txBox="1"/>
+          <p:nvPr/>
+        </p:nvSpPr>
+        <p:spPr>
+          <a:xfrm>
+            <a:off x="7283669" y="2039005"/>
+            <a:ext cx="819808" cy="369332"/>
+          </a:xfrm>
+          <a:prstGeom prst="rect">
+            <a:avLst/>
+          </a:prstGeom>
+          <a:noFill/>
+        </p:spPr>
+        <p:txBody>
+          <a:bodyPr wrap="square" rtlCol="0">
+            <a:spAutoFit/>
+          </a:bodyPr>
+          <a:lstStyle/>
+          <a:p>
+            <a:r>
+              <a:rPr lang="es-ES" dirty="0" smtClean="0"/>
+              <a:t>5%</a:t>
+            </a:r>
+            <a:endParaRPr lang="es-ES" dirty="0"/>
+          </a:p>
+        </p:txBody>
+      </p:sp>
     </p:spTree>
     <p:extLst>
       <p:ext uri="{BB962C8B-B14F-4D97-AF65-F5344CB8AC3E}">
-        <p14:creationId xmlns:p14="http://schemas.microsoft.com/office/powerpoint/2010/main" val="285103313"/>
+        <p14:creationId xmlns:p14="http://schemas.microsoft.com/office/powerpoint/2010/main" val="3386269869"/>
       </p:ext>
     </p:extLst>
   </p:cSld>
@@ -8054,21 +8157,21 @@
       </p:sp>
       <p:graphicFrame>
         <p:nvGraphicFramePr>
-          <p:cNvPr id="4" name="Gráfico 3"/>
+          <p:cNvPr id="10" name="Gráfico 9"/>
           <p:cNvGraphicFramePr>
             <a:graphicFrameLocks/>
           </p:cNvGraphicFramePr>
           <p:nvPr>
             <p:extLst>
               <p:ext uri="{D42A27DB-BD31-4B8C-83A1-F6EECF244321}">
-                <p14:modId xmlns:p14="http://schemas.microsoft.com/office/powerpoint/2010/main" val="1778833612"/>
+                <p14:modId xmlns:p14="http://schemas.microsoft.com/office/powerpoint/2010/main" val="3825528206"/>
               </p:ext>
             </p:extLst>
           </p:nvPr>
         </p:nvGraphicFramePr>
         <p:xfrm>
-          <a:off x="1098958" y="1780562"/>
-          <a:ext cx="8082571" cy="4276289"/>
+          <a:off x="1057014" y="1386909"/>
+          <a:ext cx="9169166" cy="5156503"/>
         </p:xfrm>
         <a:graphic>
           <a:graphicData uri="http://schemas.openxmlformats.org/drawingml/2006/chart">
@@ -8079,7 +8182,7 @@
     </p:spTree>
     <p:extLst>
       <p:ext uri="{BB962C8B-B14F-4D97-AF65-F5344CB8AC3E}">
-        <p14:creationId xmlns:p14="http://schemas.microsoft.com/office/powerpoint/2010/main" val="3386269869"/>
+        <p14:creationId xmlns:p14="http://schemas.microsoft.com/office/powerpoint/2010/main" val="285103313"/>
       </p:ext>
     </p:extLst>
   </p:cSld>
@@ -8158,7 +8261,9 @@
           </a:xfrm>
         </p:spPr>
         <p:txBody>
-          <a:bodyPr/>
+          <a:bodyPr>
+            <a:normAutofit fontScale="92500" lnSpcReduction="10000"/>
+          </a:bodyPr>
           <a:lstStyle/>
           <a:p>
             <a:pPr algn="just">
@@ -8203,11 +8308,7 @@
             </a:r>
             <a:r>
               <a:rPr lang="es-ES" dirty="0" smtClean="0"/>
-              <a:t> en todas las instancias el Camino Aleatorio dio mejor resultado que el Escalador de Colinas, lo que significa que </a:t>
-            </a:r>
-            <a:r>
-              <a:rPr lang="es-ES" smtClean="0"/>
-              <a:t>esta última </a:t>
+              <a:t> en todas las instancias el Camino Aleatorio dio mejor resultado que el Escalador de Colinas, lo que significa que esta última </a:t>
             </a:r>
             <a:r>
               <a:rPr lang="es-ES" dirty="0" err="1" smtClean="0"/>
@@ -8262,7 +8363,30 @@
             </a:r>
             <a:r>
               <a:rPr lang="es-ES" dirty="0" smtClean="0"/>
-              <a:t> Camino Aleatorio.</a:t>
+              <a:t> Camino Aleatorio</a:t>
+            </a:r>
+            <a:r>
+              <a:rPr lang="es-ES" dirty="0" smtClean="0"/>
+              <a:t>.</a:t>
+            </a:r>
+          </a:p>
+          <a:p>
+            <a:pPr algn="just">
+              <a:lnSpc>
+                <a:spcPct val="150000"/>
+              </a:lnSpc>
+            </a:pPr>
+            <a:r>
+              <a:rPr lang="es-ES" dirty="0" smtClean="0"/>
+              <a:t>En promedio, la </a:t>
+            </a:r>
+            <a:r>
+              <a:rPr lang="es-ES" dirty="0" err="1" smtClean="0"/>
+              <a:t>metaheurística</a:t>
+            </a:r>
+            <a:r>
+              <a:rPr lang="es-ES" dirty="0" smtClean="0"/>
+              <a:t> que da mejor resultado es el Camino Aleatorio y la que da peor es el Escalador de Colinas</a:t>
             </a:r>
             <a:endParaRPr lang="es-ES" dirty="0"/>
           </a:p>
@@ -9486,21 +9610,21 @@
                 <a:gridCol w="406400">
                   <a:extLst>
                     <a:ext uri="{9D8B030D-6E8A-4147-A177-3AD203B41FA5}">
-                      <a16:colId xmlns="" xmlns:a16="http://schemas.microsoft.com/office/drawing/2014/main" val="1801000517"/>
+                      <a16:colId xmlns:a16="http://schemas.microsoft.com/office/drawing/2014/main" val="1801000517"/>
                     </a:ext>
                   </a:extLst>
                 </a:gridCol>
                 <a:gridCol w="375920">
                   <a:extLst>
                     <a:ext uri="{9D8B030D-6E8A-4147-A177-3AD203B41FA5}">
-                      <a16:colId xmlns="" xmlns:a16="http://schemas.microsoft.com/office/drawing/2014/main" val="1657204703"/>
+                      <a16:colId xmlns:a16="http://schemas.microsoft.com/office/drawing/2014/main" val="1657204703"/>
                     </a:ext>
                   </a:extLst>
                 </a:gridCol>
                 <a:gridCol w="7325360">
                   <a:extLst>
                     <a:ext uri="{9D8B030D-6E8A-4147-A177-3AD203B41FA5}">
-                      <a16:colId xmlns="" xmlns:a16="http://schemas.microsoft.com/office/drawing/2014/main" val="3305165988"/>
+                      <a16:colId xmlns:a16="http://schemas.microsoft.com/office/drawing/2014/main" val="3305165988"/>
                     </a:ext>
                   </a:extLst>
                 </a:gridCol>
@@ -9587,7 +9711,7 @@
                 </a:tc>
                 <a:extLst>
                   <a:ext uri="{0D108BD9-81ED-4DB2-BD59-A6C34878D82A}">
-                    <a16:rowId xmlns="" xmlns:a16="http://schemas.microsoft.com/office/drawing/2014/main" val="1190365663"/>
+                    <a16:rowId xmlns:a16="http://schemas.microsoft.com/office/drawing/2014/main" val="1190365663"/>
                   </a:ext>
                 </a:extLst>
               </a:tr>
@@ -9636,7 +9760,7 @@
                 </a:tc>
                 <a:extLst>
                   <a:ext uri="{0D108BD9-81ED-4DB2-BD59-A6C34878D82A}">
-                    <a16:rowId xmlns="" xmlns:a16="http://schemas.microsoft.com/office/drawing/2014/main" val="1730090890"/>
+                    <a16:rowId xmlns:a16="http://schemas.microsoft.com/office/drawing/2014/main" val="1730090890"/>
                   </a:ext>
                 </a:extLst>
               </a:tr>
@@ -9685,7 +9809,7 @@
                 </a:tc>
                 <a:extLst>
                   <a:ext uri="{0D108BD9-81ED-4DB2-BD59-A6C34878D82A}">
-                    <a16:rowId xmlns="" xmlns:a16="http://schemas.microsoft.com/office/drawing/2014/main" val="1626348320"/>
+                    <a16:rowId xmlns:a16="http://schemas.microsoft.com/office/drawing/2014/main" val="1626348320"/>
                   </a:ext>
                 </a:extLst>
               </a:tr>
@@ -9746,7 +9870,7 @@
                 </a:tc>
                 <a:extLst>
                   <a:ext uri="{0D108BD9-81ED-4DB2-BD59-A6C34878D82A}">
-                    <a16:rowId xmlns="" xmlns:a16="http://schemas.microsoft.com/office/drawing/2014/main" val="2554951521"/>
+                    <a16:rowId xmlns:a16="http://schemas.microsoft.com/office/drawing/2014/main" val="2554951521"/>
                   </a:ext>
                 </a:extLst>
               </a:tr>
@@ -9791,7 +9915,7 @@
                 </a:tc>
                 <a:extLst>
                   <a:ext uri="{0D108BD9-81ED-4DB2-BD59-A6C34878D82A}">
-                    <a16:rowId xmlns="" xmlns:a16="http://schemas.microsoft.com/office/drawing/2014/main" val="1427695710"/>
+                    <a16:rowId xmlns:a16="http://schemas.microsoft.com/office/drawing/2014/main" val="1427695710"/>
                   </a:ext>
                 </a:extLst>
               </a:tr>
@@ -9844,7 +9968,7 @@
                 </a:tc>
                 <a:extLst>
                   <a:ext uri="{0D108BD9-81ED-4DB2-BD59-A6C34878D82A}">
-                    <a16:rowId xmlns="" xmlns:a16="http://schemas.microsoft.com/office/drawing/2014/main" val="1009187632"/>
+                    <a16:rowId xmlns:a16="http://schemas.microsoft.com/office/drawing/2014/main" val="1009187632"/>
                   </a:ext>
                 </a:extLst>
               </a:tr>
@@ -9889,7 +10013,7 @@
                 </a:tc>
                 <a:extLst>
                   <a:ext uri="{0D108BD9-81ED-4DB2-BD59-A6C34878D82A}">
-                    <a16:rowId xmlns="" xmlns:a16="http://schemas.microsoft.com/office/drawing/2014/main" val="993100956"/>
+                    <a16:rowId xmlns:a16="http://schemas.microsoft.com/office/drawing/2014/main" val="993100956"/>
                   </a:ext>
                 </a:extLst>
               </a:tr>
@@ -9934,7 +10058,7 @@
                 </a:tc>
                 <a:extLst>
                   <a:ext uri="{0D108BD9-81ED-4DB2-BD59-A6C34878D82A}">
-                    <a16:rowId xmlns="" xmlns:a16="http://schemas.microsoft.com/office/drawing/2014/main" val="3588268998"/>
+                    <a16:rowId xmlns:a16="http://schemas.microsoft.com/office/drawing/2014/main" val="3588268998"/>
                   </a:ext>
                 </a:extLst>
               </a:tr>
@@ -10122,42 +10246,42 @@
                 <a:gridCol w="1354667">
                   <a:extLst>
                     <a:ext uri="{9D8B030D-6E8A-4147-A177-3AD203B41FA5}">
-                      <a16:colId xmlns="" xmlns:a16="http://schemas.microsoft.com/office/drawing/2014/main" val="4031248115"/>
+                      <a16:colId xmlns:a16="http://schemas.microsoft.com/office/drawing/2014/main" val="4031248115"/>
                     </a:ext>
                   </a:extLst>
                 </a:gridCol>
                 <a:gridCol w="1354667">
                   <a:extLst>
                     <a:ext uri="{9D8B030D-6E8A-4147-A177-3AD203B41FA5}">
-                      <a16:colId xmlns="" xmlns:a16="http://schemas.microsoft.com/office/drawing/2014/main" val="220679877"/>
+                      <a16:colId xmlns:a16="http://schemas.microsoft.com/office/drawing/2014/main" val="220679877"/>
                     </a:ext>
                   </a:extLst>
                 </a:gridCol>
                 <a:gridCol w="1354667">
                   <a:extLst>
                     <a:ext uri="{9D8B030D-6E8A-4147-A177-3AD203B41FA5}">
-                      <a16:colId xmlns="" xmlns:a16="http://schemas.microsoft.com/office/drawing/2014/main" val="2773510325"/>
+                      <a16:colId xmlns:a16="http://schemas.microsoft.com/office/drawing/2014/main" val="2773510325"/>
                     </a:ext>
                   </a:extLst>
                 </a:gridCol>
                 <a:gridCol w="1354667">
                   <a:extLst>
                     <a:ext uri="{9D8B030D-6E8A-4147-A177-3AD203B41FA5}">
-                      <a16:colId xmlns="" xmlns:a16="http://schemas.microsoft.com/office/drawing/2014/main" val="269533158"/>
+                      <a16:colId xmlns:a16="http://schemas.microsoft.com/office/drawing/2014/main" val="269533158"/>
                     </a:ext>
                   </a:extLst>
                 </a:gridCol>
                 <a:gridCol w="1354667">
                   <a:extLst>
                     <a:ext uri="{9D8B030D-6E8A-4147-A177-3AD203B41FA5}">
-                      <a16:colId xmlns="" xmlns:a16="http://schemas.microsoft.com/office/drawing/2014/main" val="4000846733"/>
+                      <a16:colId xmlns:a16="http://schemas.microsoft.com/office/drawing/2014/main" val="4000846733"/>
                     </a:ext>
                   </a:extLst>
                 </a:gridCol>
                 <a:gridCol w="1354667">
                   <a:extLst>
                     <a:ext uri="{9D8B030D-6E8A-4147-A177-3AD203B41FA5}">
-                      <a16:colId xmlns="" xmlns:a16="http://schemas.microsoft.com/office/drawing/2014/main" val="465695325"/>
+                      <a16:colId xmlns:a16="http://schemas.microsoft.com/office/drawing/2014/main" val="465695325"/>
                     </a:ext>
                   </a:extLst>
                 </a:gridCol>
@@ -10245,7 +10369,7 @@
                 </a:tc>
                 <a:extLst>
                   <a:ext uri="{0D108BD9-81ED-4DB2-BD59-A6C34878D82A}">
-                    <a16:rowId xmlns="" xmlns:a16="http://schemas.microsoft.com/office/drawing/2014/main" val="1848507414"/>
+                    <a16:rowId xmlns:a16="http://schemas.microsoft.com/office/drawing/2014/main" val="1848507414"/>
                   </a:ext>
                 </a:extLst>
               </a:tr>
@@ -10335,7 +10459,7 @@
                 </a:tc>
                 <a:extLst>
                   <a:ext uri="{0D108BD9-81ED-4DB2-BD59-A6C34878D82A}">
-                    <a16:rowId xmlns="" xmlns:a16="http://schemas.microsoft.com/office/drawing/2014/main" val="3575386969"/>
+                    <a16:rowId xmlns:a16="http://schemas.microsoft.com/office/drawing/2014/main" val="3575386969"/>
                   </a:ext>
                 </a:extLst>
               </a:tr>
@@ -10429,7 +10553,7 @@
                 </a:tc>
                 <a:extLst>
                   <a:ext uri="{0D108BD9-81ED-4DB2-BD59-A6C34878D82A}">
-                    <a16:rowId xmlns="" xmlns:a16="http://schemas.microsoft.com/office/drawing/2014/main" val="4209900852"/>
+                    <a16:rowId xmlns:a16="http://schemas.microsoft.com/office/drawing/2014/main" val="4209900852"/>
                   </a:ext>
                 </a:extLst>
               </a:tr>
@@ -10515,7 +10639,7 @@
                 </a:tc>
                 <a:extLst>
                   <a:ext uri="{0D108BD9-81ED-4DB2-BD59-A6C34878D82A}">
-                    <a16:rowId xmlns="" xmlns:a16="http://schemas.microsoft.com/office/drawing/2014/main" val="2009515904"/>
+                    <a16:rowId xmlns:a16="http://schemas.microsoft.com/office/drawing/2014/main" val="2009515904"/>
                   </a:ext>
                 </a:extLst>
               </a:tr>
@@ -10626,7 +10750,7 @@
                 </a:tc>
                 <a:extLst>
                   <a:ext uri="{0D108BD9-81ED-4DB2-BD59-A6C34878D82A}">
-                    <a16:rowId xmlns="" xmlns:a16="http://schemas.microsoft.com/office/drawing/2014/main" val="3195264674"/>
+                    <a16:rowId xmlns:a16="http://schemas.microsoft.com/office/drawing/2014/main" val="3195264674"/>
                   </a:ext>
                 </a:extLst>
               </a:tr>
@@ -10662,42 +10786,42 @@
                 <a:gridCol w="1354667">
                   <a:extLst>
                     <a:ext uri="{9D8B030D-6E8A-4147-A177-3AD203B41FA5}">
-                      <a16:colId xmlns="" xmlns:a16="http://schemas.microsoft.com/office/drawing/2014/main" val="4031248115"/>
+                      <a16:colId xmlns:a16="http://schemas.microsoft.com/office/drawing/2014/main" val="4031248115"/>
                     </a:ext>
                   </a:extLst>
                 </a:gridCol>
                 <a:gridCol w="1354667">
                   <a:extLst>
                     <a:ext uri="{9D8B030D-6E8A-4147-A177-3AD203B41FA5}">
-                      <a16:colId xmlns="" xmlns:a16="http://schemas.microsoft.com/office/drawing/2014/main" val="220679877"/>
+                      <a16:colId xmlns:a16="http://schemas.microsoft.com/office/drawing/2014/main" val="220679877"/>
                     </a:ext>
                   </a:extLst>
                 </a:gridCol>
                 <a:gridCol w="1354667">
                   <a:extLst>
                     <a:ext uri="{9D8B030D-6E8A-4147-A177-3AD203B41FA5}">
-                      <a16:colId xmlns="" xmlns:a16="http://schemas.microsoft.com/office/drawing/2014/main" val="2773510325"/>
+                      <a16:colId xmlns:a16="http://schemas.microsoft.com/office/drawing/2014/main" val="2773510325"/>
                     </a:ext>
                   </a:extLst>
                 </a:gridCol>
                 <a:gridCol w="1354667">
                   <a:extLst>
                     <a:ext uri="{9D8B030D-6E8A-4147-A177-3AD203B41FA5}">
-                      <a16:colId xmlns="" xmlns:a16="http://schemas.microsoft.com/office/drawing/2014/main" val="269533158"/>
+                      <a16:colId xmlns:a16="http://schemas.microsoft.com/office/drawing/2014/main" val="269533158"/>
                     </a:ext>
                   </a:extLst>
                 </a:gridCol>
                 <a:gridCol w="1354667">
                   <a:extLst>
                     <a:ext uri="{9D8B030D-6E8A-4147-A177-3AD203B41FA5}">
-                      <a16:colId xmlns="" xmlns:a16="http://schemas.microsoft.com/office/drawing/2014/main" val="4000846733"/>
+                      <a16:colId xmlns:a16="http://schemas.microsoft.com/office/drawing/2014/main" val="4000846733"/>
                     </a:ext>
                   </a:extLst>
                 </a:gridCol>
                 <a:gridCol w="1354667">
                   <a:extLst>
                     <a:ext uri="{9D8B030D-6E8A-4147-A177-3AD203B41FA5}">
-                      <a16:colId xmlns="" xmlns:a16="http://schemas.microsoft.com/office/drawing/2014/main" val="465695325"/>
+                      <a16:colId xmlns:a16="http://schemas.microsoft.com/office/drawing/2014/main" val="465695325"/>
                     </a:ext>
                   </a:extLst>
                 </a:gridCol>
@@ -10785,7 +10909,7 @@
                 </a:tc>
                 <a:extLst>
                   <a:ext uri="{0D108BD9-81ED-4DB2-BD59-A6C34878D82A}">
-                    <a16:rowId xmlns="" xmlns:a16="http://schemas.microsoft.com/office/drawing/2014/main" val="1848507414"/>
+                    <a16:rowId xmlns:a16="http://schemas.microsoft.com/office/drawing/2014/main" val="1848507414"/>
                   </a:ext>
                 </a:extLst>
               </a:tr>
@@ -10875,7 +10999,7 @@
                 </a:tc>
                 <a:extLst>
                   <a:ext uri="{0D108BD9-81ED-4DB2-BD59-A6C34878D82A}">
-                    <a16:rowId xmlns="" xmlns:a16="http://schemas.microsoft.com/office/drawing/2014/main" val="3575386969"/>
+                    <a16:rowId xmlns:a16="http://schemas.microsoft.com/office/drawing/2014/main" val="3575386969"/>
                   </a:ext>
                 </a:extLst>
               </a:tr>
@@ -10969,7 +11093,7 @@
                 </a:tc>
                 <a:extLst>
                   <a:ext uri="{0D108BD9-81ED-4DB2-BD59-A6C34878D82A}">
-                    <a16:rowId xmlns="" xmlns:a16="http://schemas.microsoft.com/office/drawing/2014/main" val="4209900852"/>
+                    <a16:rowId xmlns:a16="http://schemas.microsoft.com/office/drawing/2014/main" val="4209900852"/>
                   </a:ext>
                 </a:extLst>
               </a:tr>
@@ -11055,7 +11179,7 @@
                 </a:tc>
                 <a:extLst>
                   <a:ext uri="{0D108BD9-81ED-4DB2-BD59-A6C34878D82A}">
-                    <a16:rowId xmlns="" xmlns:a16="http://schemas.microsoft.com/office/drawing/2014/main" val="2009515904"/>
+                    <a16:rowId xmlns:a16="http://schemas.microsoft.com/office/drawing/2014/main" val="2009515904"/>
                   </a:ext>
                 </a:extLst>
               </a:tr>
@@ -11200,7 +11324,7 @@
                 </a:tc>
                 <a:extLst>
                   <a:ext uri="{0D108BD9-81ED-4DB2-BD59-A6C34878D82A}">
-                    <a16:rowId xmlns="" xmlns:a16="http://schemas.microsoft.com/office/drawing/2014/main" val="3195264674"/>
+                    <a16:rowId xmlns:a16="http://schemas.microsoft.com/office/drawing/2014/main" val="3195264674"/>
                   </a:ext>
                 </a:extLst>
               </a:tr>
@@ -11424,14 +11548,14 @@
                 <a:gridCol w="406400">
                   <a:extLst>
                     <a:ext uri="{9D8B030D-6E8A-4147-A177-3AD203B41FA5}">
-                      <a16:colId xmlns="" xmlns:a16="http://schemas.microsoft.com/office/drawing/2014/main" val="1801000517"/>
+                      <a16:colId xmlns:a16="http://schemas.microsoft.com/office/drawing/2014/main" val="1801000517"/>
                     </a:ext>
                   </a:extLst>
                 </a:gridCol>
                 <a:gridCol w="7701280">
                   <a:extLst>
                     <a:ext uri="{9D8B030D-6E8A-4147-A177-3AD203B41FA5}">
-                      <a16:colId xmlns="" xmlns:a16="http://schemas.microsoft.com/office/drawing/2014/main" val="1657204703"/>
+                      <a16:colId xmlns:a16="http://schemas.microsoft.com/office/drawing/2014/main" val="1657204703"/>
                     </a:ext>
                   </a:extLst>
                 </a:gridCol>
@@ -11471,7 +11595,7 @@
                 </a:tc>
                 <a:extLst>
                   <a:ext uri="{0D108BD9-81ED-4DB2-BD59-A6C34878D82A}">
-                    <a16:rowId xmlns="" xmlns:a16="http://schemas.microsoft.com/office/drawing/2014/main" val="1190365663"/>
+                    <a16:rowId xmlns:a16="http://schemas.microsoft.com/office/drawing/2014/main" val="1190365663"/>
                   </a:ext>
                 </a:extLst>
               </a:tr>
@@ -11510,7 +11634,7 @@
                 </a:tc>
                 <a:extLst>
                   <a:ext uri="{0D108BD9-81ED-4DB2-BD59-A6C34878D82A}">
-                    <a16:rowId xmlns="" xmlns:a16="http://schemas.microsoft.com/office/drawing/2014/main" val="1730090890"/>
+                    <a16:rowId xmlns:a16="http://schemas.microsoft.com/office/drawing/2014/main" val="1730090890"/>
                   </a:ext>
                 </a:extLst>
               </a:tr>
@@ -11577,7 +11701,7 @@
                 </a:tc>
                 <a:extLst>
                   <a:ext uri="{0D108BD9-81ED-4DB2-BD59-A6C34878D82A}">
-                    <a16:rowId xmlns="" xmlns:a16="http://schemas.microsoft.com/office/drawing/2014/main" val="1626348320"/>
+                    <a16:rowId xmlns:a16="http://schemas.microsoft.com/office/drawing/2014/main" val="1626348320"/>
                   </a:ext>
                 </a:extLst>
               </a:tr>
@@ -11627,7 +11751,7 @@
                 </a:tc>
                 <a:extLst>
                   <a:ext uri="{0D108BD9-81ED-4DB2-BD59-A6C34878D82A}">
-                    <a16:rowId xmlns="" xmlns:a16="http://schemas.microsoft.com/office/drawing/2014/main" val="993100956"/>
+                    <a16:rowId xmlns:a16="http://schemas.microsoft.com/office/drawing/2014/main" val="993100956"/>
                   </a:ext>
                 </a:extLst>
               </a:tr>
@@ -11674,7 +11798,7 @@
                 </a:tc>
                 <a:extLst>
                   <a:ext uri="{0D108BD9-81ED-4DB2-BD59-A6C34878D82A}">
-                    <a16:rowId xmlns="" xmlns:a16="http://schemas.microsoft.com/office/drawing/2014/main" val="3588268998"/>
+                    <a16:rowId xmlns:a16="http://schemas.microsoft.com/office/drawing/2014/main" val="3588268998"/>
                   </a:ext>
                 </a:extLst>
               </a:tr>
@@ -11713,7 +11837,7 @@
                 </a:tc>
                 <a:extLst>
                   <a:ext uri="{0D108BD9-81ED-4DB2-BD59-A6C34878D82A}">
-                    <a16:rowId xmlns="" xmlns:a16="http://schemas.microsoft.com/office/drawing/2014/main" val="2826695688"/>
+                    <a16:rowId xmlns:a16="http://schemas.microsoft.com/office/drawing/2014/main" val="2826695688"/>
                   </a:ext>
                 </a:extLst>
               </a:tr>
@@ -12320,28 +12444,28 @@
                 <a:gridCol w="406400">
                   <a:extLst>
                     <a:ext uri="{9D8B030D-6E8A-4147-A177-3AD203B41FA5}">
-                      <a16:colId xmlns="" xmlns:a16="http://schemas.microsoft.com/office/drawing/2014/main" val="1801000517"/>
+                      <a16:colId xmlns:a16="http://schemas.microsoft.com/office/drawing/2014/main" val="1801000517"/>
                     </a:ext>
                   </a:extLst>
                 </a:gridCol>
                 <a:gridCol w="465328">
                   <a:extLst>
                     <a:ext uri="{9D8B030D-6E8A-4147-A177-3AD203B41FA5}">
-                      <a16:colId xmlns="" xmlns:a16="http://schemas.microsoft.com/office/drawing/2014/main" val="1657204703"/>
+                      <a16:colId xmlns:a16="http://schemas.microsoft.com/office/drawing/2014/main" val="1657204703"/>
                     </a:ext>
                   </a:extLst>
                 </a:gridCol>
                 <a:gridCol w="355600">
                   <a:extLst>
                     <a:ext uri="{9D8B030D-6E8A-4147-A177-3AD203B41FA5}">
-                      <a16:colId xmlns="" xmlns:a16="http://schemas.microsoft.com/office/drawing/2014/main" val="2374098939"/>
+                      <a16:colId xmlns:a16="http://schemas.microsoft.com/office/drawing/2014/main" val="2374098939"/>
                     </a:ext>
                   </a:extLst>
                 </a:gridCol>
                 <a:gridCol w="6880352">
                   <a:extLst>
                     <a:ext uri="{9D8B030D-6E8A-4147-A177-3AD203B41FA5}">
-                      <a16:colId xmlns="" xmlns:a16="http://schemas.microsoft.com/office/drawing/2014/main" val="76615332"/>
+                      <a16:colId xmlns:a16="http://schemas.microsoft.com/office/drawing/2014/main" val="76615332"/>
                     </a:ext>
                   </a:extLst>
                 </a:gridCol>
@@ -12399,7 +12523,7 @@
                 </a:tc>
                 <a:extLst>
                   <a:ext uri="{0D108BD9-81ED-4DB2-BD59-A6C34878D82A}">
-                    <a16:rowId xmlns="" xmlns:a16="http://schemas.microsoft.com/office/drawing/2014/main" val="1190365663"/>
+                    <a16:rowId xmlns:a16="http://schemas.microsoft.com/office/drawing/2014/main" val="1190365663"/>
                   </a:ext>
                 </a:extLst>
               </a:tr>
@@ -12458,7 +12582,7 @@
                 </a:tc>
                 <a:extLst>
                   <a:ext uri="{0D108BD9-81ED-4DB2-BD59-A6C34878D82A}">
-                    <a16:rowId xmlns="" xmlns:a16="http://schemas.microsoft.com/office/drawing/2014/main" val="1730090890"/>
+                    <a16:rowId xmlns:a16="http://schemas.microsoft.com/office/drawing/2014/main" val="1730090890"/>
                   </a:ext>
                 </a:extLst>
               </a:tr>
@@ -12530,7 +12654,7 @@
                 </a:tc>
                 <a:extLst>
                   <a:ext uri="{0D108BD9-81ED-4DB2-BD59-A6C34878D82A}">
-                    <a16:rowId xmlns="" xmlns:a16="http://schemas.microsoft.com/office/drawing/2014/main" val="1626348320"/>
+                    <a16:rowId xmlns:a16="http://schemas.microsoft.com/office/drawing/2014/main" val="1626348320"/>
                   </a:ext>
                 </a:extLst>
               </a:tr>
@@ -12606,7 +12730,7 @@
                 </a:tc>
                 <a:extLst>
                   <a:ext uri="{0D108BD9-81ED-4DB2-BD59-A6C34878D82A}">
-                    <a16:rowId xmlns="" xmlns:a16="http://schemas.microsoft.com/office/drawing/2014/main" val="993100956"/>
+                    <a16:rowId xmlns:a16="http://schemas.microsoft.com/office/drawing/2014/main" val="993100956"/>
                   </a:ext>
                 </a:extLst>
               </a:tr>
@@ -12669,7 +12793,7 @@
                 </a:tc>
                 <a:extLst>
                   <a:ext uri="{0D108BD9-81ED-4DB2-BD59-A6C34878D82A}">
-                    <a16:rowId xmlns="" xmlns:a16="http://schemas.microsoft.com/office/drawing/2014/main" val="3588268998"/>
+                    <a16:rowId xmlns:a16="http://schemas.microsoft.com/office/drawing/2014/main" val="3588268998"/>
                   </a:ext>
                 </a:extLst>
               </a:tr>
@@ -12724,7 +12848,7 @@
                 </a:tc>
                 <a:extLst>
                   <a:ext uri="{0D108BD9-81ED-4DB2-BD59-A6C34878D82A}">
-                    <a16:rowId xmlns="" xmlns:a16="http://schemas.microsoft.com/office/drawing/2014/main" val="2137013417"/>
+                    <a16:rowId xmlns:a16="http://schemas.microsoft.com/office/drawing/2014/main" val="2137013417"/>
                   </a:ext>
                 </a:extLst>
               </a:tr>
@@ -12779,7 +12903,7 @@
                 </a:tc>
                 <a:extLst>
                   <a:ext uri="{0D108BD9-81ED-4DB2-BD59-A6C34878D82A}">
-                    <a16:rowId xmlns="" xmlns:a16="http://schemas.microsoft.com/office/drawing/2014/main" val="3367745634"/>
+                    <a16:rowId xmlns:a16="http://schemas.microsoft.com/office/drawing/2014/main" val="3367745634"/>
                   </a:ext>
                 </a:extLst>
               </a:tr>
@@ -12834,7 +12958,7 @@
                 </a:tc>
                 <a:extLst>
                   <a:ext uri="{0D108BD9-81ED-4DB2-BD59-A6C34878D82A}">
-                    <a16:rowId xmlns="" xmlns:a16="http://schemas.microsoft.com/office/drawing/2014/main" val="2048022435"/>
+                    <a16:rowId xmlns:a16="http://schemas.microsoft.com/office/drawing/2014/main" val="2048022435"/>
                   </a:ext>
                 </a:extLst>
               </a:tr>
@@ -12893,7 +13017,7 @@
                 </a:tc>
                 <a:extLst>
                   <a:ext uri="{0D108BD9-81ED-4DB2-BD59-A6C34878D82A}">
-                    <a16:rowId xmlns="" xmlns:a16="http://schemas.microsoft.com/office/drawing/2014/main" val="2826695688"/>
+                    <a16:rowId xmlns:a16="http://schemas.microsoft.com/office/drawing/2014/main" val="2826695688"/>
                   </a:ext>
                 </a:extLst>
               </a:tr>

</xml_diff>